<commit_message>
fix the java script bug
</commit_message>
<xml_diff>
--- a/documents/innoparts_user_guide.pptx
+++ b/documents/innoparts_user_guide.pptx
@@ -232,7 +232,7 @@
             <a:fld id="{15A159CE-62C0-4076-A0EC-CA98B45244E2}" type="datetimeFigureOut">
               <a:rPr lang="ko-KR" altLang="en-US" smtClean="0"/>
               <a:pPr/>
-              <a:t>2016-10-14</a:t>
+              <a:t>2016-11-02</a:t>
             </a:fld>
             <a:endParaRPr lang="ko-KR" altLang="en-US"/>
           </a:p>
@@ -399,7 +399,7 @@
             <a:fld id="{4031041E-3402-46BC-9F7B-1A9B30D5AA9E}" type="datetimeFigureOut">
               <a:rPr lang="ko-KR" altLang="en-US" smtClean="0"/>
               <a:pPr/>
-              <a:t>2016-10-14</a:t>
+              <a:t>2016-11-02</a:t>
             </a:fld>
             <a:endParaRPr lang="ko-KR" altLang="en-US"/>
           </a:p>
@@ -849,7 +849,7 @@
           <a:p>
             <a:fld id="{C1898A93-C5D9-4E75-9769-6CA28F48A7CD}" type="datetimeFigureOut">
               <a:rPr lang="ko-KR" altLang="en-US" smtClean="0"/>
-              <a:t>2016-10-14</a:t>
+              <a:t>2016-11-02</a:t>
             </a:fld>
             <a:endParaRPr lang="ko-KR" altLang="en-US"/>
           </a:p>
@@ -1084,7 +1084,7 @@
           <a:p>
             <a:fld id="{C1898A93-C5D9-4E75-9769-6CA28F48A7CD}" type="datetimeFigureOut">
               <a:rPr lang="ko-KR" altLang="en-US" smtClean="0"/>
-              <a:t>2016-10-14</a:t>
+              <a:t>2016-11-02</a:t>
             </a:fld>
             <a:endParaRPr lang="ko-KR" altLang="en-US"/>
           </a:p>
@@ -1360,7 +1360,7 @@
               <a:pPr>
                 <a:defRPr/>
               </a:pPr>
-              <a:t>2016-10-14</a:t>
+              <a:t>2016-11-02</a:t>
             </a:fld>
             <a:endParaRPr lang="ko-KR" altLang="en-US"/>
           </a:p>
@@ -16312,64 +16312,6 @@
           <a:chExt cx="0" cy="0"/>
         </a:xfrm>
       </p:grpSpPr>
-      <p:pic>
-        <p:nvPicPr>
-          <p:cNvPr id="1026" name="Picture 2"/>
-          <p:cNvPicPr>
-            <a:picLocks noChangeAspect="1" noChangeArrowheads="1"/>
-          </p:cNvPicPr>
-          <p:nvPr/>
-        </p:nvPicPr>
-        <p:blipFill rotWithShape="1">
-          <a:blip r:embed="rId2">
-            <a:extLst>
-              <a:ext uri="{28A0092B-C50C-407E-A947-70E740481C1C}">
-                <a14:useLocalDpi xmlns:a14="http://schemas.microsoft.com/office/drawing/2010/main" val="0"/>
-              </a:ext>
-            </a:extLst>
-          </a:blip>
-          <a:srcRect b="21271"/>
-          <a:stretch/>
-        </p:blipFill>
-        <p:spPr bwMode="auto">
-          <a:xfrm>
-            <a:off x="216025" y="1645546"/>
-            <a:ext cx="9560717" cy="2012054"/>
-          </a:xfrm>
-          <a:prstGeom prst="rect">
-            <a:avLst/>
-          </a:prstGeom>
-          <a:noFill/>
-          <a:ln w="9525">
-            <a:solidFill>
-              <a:schemeClr val="tx1">
-                <a:alpha val="66000"/>
-              </a:schemeClr>
-            </a:solidFill>
-            <a:miter lim="800000"/>
-            <a:headEnd/>
-            <a:tailEnd/>
-          </a:ln>
-          <a:extLst>
-            <a:ext uri="{909E8E84-426E-40DD-AFC4-6F175D3DCCD1}">
-              <a14:hiddenFill xmlns:a14="http://schemas.microsoft.com/office/drawing/2010/main">
-                <a:solidFill>
-                  <a:schemeClr val="accent1"/>
-                </a:solidFill>
-              </a14:hiddenFill>
-            </a:ext>
-            <a:ext uri="{AF507438-7753-43E0-B8FC-AC1667EBCBE1}">
-              <a14:hiddenEffects xmlns:a14="http://schemas.microsoft.com/office/drawing/2010/main">
-                <a:effectLst>
-                  <a:outerShdw dist="35921" dir="2700000" algn="ctr" rotWithShape="0">
-                    <a:schemeClr val="bg2"/>
-                  </a:outerShdw>
-                </a:effectLst>
-              </a14:hiddenEffects>
-            </a:ext>
-          </a:extLst>
-        </p:spPr>
-      </p:pic>
       <p:sp>
         <p:nvSpPr>
           <p:cNvPr id="2" name="제목 1"/>
@@ -16393,64 +16335,6 @@
           </a:p>
         </p:txBody>
       </p:sp>
-      <p:pic>
-        <p:nvPicPr>
-          <p:cNvPr id="25602" name="Picture 2"/>
-          <p:cNvPicPr>
-            <a:picLocks noChangeAspect="1" noChangeArrowheads="1"/>
-          </p:cNvPicPr>
-          <p:nvPr/>
-        </p:nvPicPr>
-        <p:blipFill rotWithShape="1">
-          <a:blip r:embed="rId3">
-            <a:extLst>
-              <a:ext uri="{28A0092B-C50C-407E-A947-70E740481C1C}">
-                <a14:useLocalDpi xmlns:a14="http://schemas.microsoft.com/office/drawing/2010/main" val="0"/>
-              </a:ext>
-            </a:extLst>
-          </a:blip>
-          <a:srcRect b="11792"/>
-          <a:stretch/>
-        </p:blipFill>
-        <p:spPr bwMode="auto">
-          <a:xfrm>
-            <a:off x="199678" y="4589489"/>
-            <a:ext cx="9577064" cy="2024442"/>
-          </a:xfrm>
-          <a:prstGeom prst="rect">
-            <a:avLst/>
-          </a:prstGeom>
-          <a:noFill/>
-          <a:ln w="9525">
-            <a:solidFill>
-              <a:schemeClr val="tx1">
-                <a:alpha val="66000"/>
-              </a:schemeClr>
-            </a:solidFill>
-            <a:miter lim="800000"/>
-            <a:headEnd/>
-            <a:tailEnd/>
-          </a:ln>
-          <a:extLst>
-            <a:ext uri="{909E8E84-426E-40DD-AFC4-6F175D3DCCD1}">
-              <a14:hiddenFill xmlns:a14="http://schemas.microsoft.com/office/drawing/2010/main">
-                <a:solidFill>
-                  <a:schemeClr val="accent1"/>
-                </a:solidFill>
-              </a14:hiddenFill>
-            </a:ext>
-            <a:ext uri="{AF507438-7753-43E0-B8FC-AC1667EBCBE1}">
-              <a14:hiddenEffects xmlns:a14="http://schemas.microsoft.com/office/drawing/2010/main">
-                <a:effectLst>
-                  <a:outerShdw dist="35921" dir="2700000" algn="ctr" rotWithShape="0">
-                    <a:schemeClr val="bg2"/>
-                  </a:outerShdw>
-                </a:effectLst>
-              </a14:hiddenEffects>
-            </a:ext>
-          </a:extLst>
-        </p:spPr>
-      </p:pic>
       <p:sp>
         <p:nvSpPr>
           <p:cNvPr id="5" name="내용 개체 틀 4"/>
@@ -16725,6 +16609,122 @@
           </a:p>
         </p:txBody>
       </p:sp>
+      <p:pic>
+        <p:nvPicPr>
+          <p:cNvPr id="3" name="Picture 2"/>
+          <p:cNvPicPr>
+            <a:picLocks noChangeAspect="1" noChangeArrowheads="1"/>
+          </p:cNvPicPr>
+          <p:nvPr/>
+        </p:nvPicPr>
+        <p:blipFill>
+          <a:blip r:embed="rId2">
+            <a:extLst>
+              <a:ext uri="{28A0092B-C50C-407E-A947-70E740481C1C}">
+                <a14:useLocalDpi xmlns:a14="http://schemas.microsoft.com/office/drawing/2010/main" val="0"/>
+              </a:ext>
+            </a:extLst>
+          </a:blip>
+          <a:srcRect/>
+          <a:stretch>
+            <a:fillRect/>
+          </a:stretch>
+        </p:blipFill>
+        <p:spPr bwMode="auto">
+          <a:xfrm>
+            <a:off x="62857" y="1706853"/>
+            <a:ext cx="9794107" cy="1650139"/>
+          </a:xfrm>
+          <a:prstGeom prst="rect">
+            <a:avLst/>
+          </a:prstGeom>
+          <a:noFill/>
+          <a:ln w="9525">
+            <a:solidFill>
+              <a:schemeClr val="tx1"/>
+            </a:solidFill>
+            <a:miter lim="800000"/>
+            <a:headEnd/>
+            <a:tailEnd/>
+          </a:ln>
+          <a:effectLst/>
+          <a:extLst>
+            <a:ext uri="{909E8E84-426E-40DD-AFC4-6F175D3DCCD1}">
+              <a14:hiddenFill xmlns:a14="http://schemas.microsoft.com/office/drawing/2010/main">
+                <a:solidFill>
+                  <a:schemeClr val="accent1"/>
+                </a:solidFill>
+              </a14:hiddenFill>
+            </a:ext>
+            <a:ext uri="{AF507438-7753-43E0-B8FC-AC1667EBCBE1}">
+              <a14:hiddenEffects xmlns:a14="http://schemas.microsoft.com/office/drawing/2010/main">
+                <a:effectLst>
+                  <a:outerShdw dist="35921" dir="2700000" algn="ctr" rotWithShape="0">
+                    <a:schemeClr val="bg2"/>
+                  </a:outerShdw>
+                </a:effectLst>
+              </a14:hiddenEffects>
+            </a:ext>
+          </a:extLst>
+        </p:spPr>
+      </p:pic>
+      <p:pic>
+        <p:nvPicPr>
+          <p:cNvPr id="1027" name="Picture 3"/>
+          <p:cNvPicPr>
+            <a:picLocks noChangeAspect="1" noChangeArrowheads="1"/>
+          </p:cNvPicPr>
+          <p:nvPr/>
+        </p:nvPicPr>
+        <p:blipFill rotWithShape="1">
+          <a:blip r:embed="rId3">
+            <a:extLst>
+              <a:ext uri="{28A0092B-C50C-407E-A947-70E740481C1C}">
+                <a14:useLocalDpi xmlns:a14="http://schemas.microsoft.com/office/drawing/2010/main" val="0"/>
+              </a:ext>
+            </a:extLst>
+          </a:blip>
+          <a:srcRect l="1055" r="835"/>
+          <a:stretch/>
+        </p:blipFill>
+        <p:spPr bwMode="auto">
+          <a:xfrm>
+            <a:off x="55662" y="4509120"/>
+            <a:ext cx="9794107" cy="1592671"/>
+          </a:xfrm>
+          <a:prstGeom prst="rect">
+            <a:avLst/>
+          </a:prstGeom>
+          <a:noFill/>
+          <a:ln w="9525">
+            <a:solidFill>
+              <a:schemeClr val="tx1"/>
+            </a:solidFill>
+            <a:miter lim="800000"/>
+            <a:headEnd/>
+            <a:tailEnd/>
+          </a:ln>
+          <a:effectLst/>
+          <a:extLst>
+            <a:ext uri="{909E8E84-426E-40DD-AFC4-6F175D3DCCD1}">
+              <a14:hiddenFill xmlns:a14="http://schemas.microsoft.com/office/drawing/2010/main">
+                <a:solidFill>
+                  <a:schemeClr val="accent1"/>
+                </a:solidFill>
+              </a14:hiddenFill>
+            </a:ext>
+            <a:ext uri="{AF507438-7753-43E0-B8FC-AC1667EBCBE1}">
+              <a14:hiddenEffects xmlns:a14="http://schemas.microsoft.com/office/drawing/2010/main">
+                <a:effectLst>
+                  <a:outerShdw dist="35921" dir="2700000" algn="ctr" rotWithShape="0">
+                    <a:schemeClr val="bg2"/>
+                  </a:outerShdw>
+                </a:effectLst>
+              </a14:hiddenEffects>
+            </a:ext>
+          </a:extLst>
+        </p:spPr>
+      </p:pic>
     </p:spTree>
     <p:extLst>
       <p:ext uri="{BB962C8B-B14F-4D97-AF65-F5344CB8AC3E}">

</xml_diff>

<commit_message>
modify ppt file for user guide
</commit_message>
<xml_diff>
--- a/documents/innoparts_user_guide.pptx
+++ b/documents/innoparts_user_guide.pptx
@@ -237,7 +237,7 @@
             <a:fld id="{15A159CE-62C0-4076-A0EC-CA98B45244E2}" type="datetimeFigureOut">
               <a:rPr lang="ko-KR" altLang="en-US" smtClean="0"/>
               <a:pPr/>
-              <a:t>2016-11-02</a:t>
+              <a:t>2016-11-10</a:t>
             </a:fld>
             <a:endParaRPr lang="ko-KR" altLang="en-US"/>
           </a:p>
@@ -404,7 +404,7 @@
             <a:fld id="{4031041E-3402-46BC-9F7B-1A9B30D5AA9E}" type="datetimeFigureOut">
               <a:rPr lang="ko-KR" altLang="en-US" smtClean="0"/>
               <a:pPr/>
-              <a:t>2016-11-02</a:t>
+              <a:t>2016-11-10</a:t>
             </a:fld>
             <a:endParaRPr lang="ko-KR" altLang="en-US"/>
           </a:p>
@@ -854,7 +854,7 @@
           <a:p>
             <a:fld id="{C1898A93-C5D9-4E75-9769-6CA28F48A7CD}" type="datetimeFigureOut">
               <a:rPr lang="ko-KR" altLang="en-US" smtClean="0"/>
-              <a:t>2016-11-02</a:t>
+              <a:t>2016-11-10</a:t>
             </a:fld>
             <a:endParaRPr lang="ko-KR" altLang="en-US"/>
           </a:p>
@@ -1089,7 +1089,7 @@
           <a:p>
             <a:fld id="{C1898A93-C5D9-4E75-9769-6CA28F48A7CD}" type="datetimeFigureOut">
               <a:rPr lang="ko-KR" altLang="en-US" smtClean="0"/>
-              <a:t>2016-11-02</a:t>
+              <a:t>2016-11-10</a:t>
             </a:fld>
             <a:endParaRPr lang="ko-KR" altLang="en-US"/>
           </a:p>
@@ -1365,7 +1365,7 @@
               <a:pPr>
                 <a:defRPr/>
               </a:pPr>
-              <a:t>2016-11-02</a:t>
+              <a:t>2016-11-10</a:t>
             </a:fld>
             <a:endParaRPr lang="ko-KR" altLang="en-US"/>
           </a:p>
@@ -2380,14 +2380,7 @@
                 <a:latin typeface="HY그래픽M" pitchFamily="18" charset="-127"/>
                 <a:ea typeface="HY그래픽M" pitchFamily="18" charset="-127"/>
               </a:rPr>
-              <a:t> </a:t>
-            </a:r>
-            <a:r>
-              <a:rPr lang="en-US" altLang="ko-KR" sz="2400" dirty="0" smtClean="0">
-                <a:latin typeface="HY그래픽M" pitchFamily="18" charset="-127"/>
-                <a:ea typeface="HY그래픽M" pitchFamily="18" charset="-127"/>
-              </a:rPr>
-              <a:t>1.0 </a:t>
+              <a:t> 1.0 </a:t>
             </a:r>
             <a:r>
               <a:rPr lang="ko-KR" altLang="en-US" sz="2400" dirty="0" err="1" smtClean="0">
@@ -2445,10 +2438,6 @@
               </a:rPr>
               <a:t>aeyong1.park@lginnotek.com</a:t>
             </a:r>
-            <a:endParaRPr lang="en-US" altLang="ko-KR" sz="2400" dirty="0" smtClean="0">
-              <a:latin typeface="HY그래픽M" pitchFamily="18" charset="-127"/>
-              <a:ea typeface="HY그래픽M" pitchFamily="18" charset="-127"/>
-            </a:endParaRPr>
           </a:p>
         </p:txBody>
       </p:sp>
@@ -2937,11 +2926,7 @@
             </a:r>
             <a:r>
               <a:rPr lang="en-US" altLang="ko-KR" sz="1600" dirty="0" smtClean="0"/>
-              <a:t>. </a:t>
-            </a:r>
-            <a:r>
-              <a:rPr lang="en-US" altLang="ko-KR" sz="1600" dirty="0" smtClean="0"/>
-              <a:t> </a:t>
+              <a:t>.  </a:t>
             </a:r>
             <a:r>
               <a:rPr lang="ko-KR" altLang="en-US" sz="1600" dirty="0" err="1" smtClean="0"/>
@@ -3013,19 +2998,15 @@
           <a:p>
             <a:r>
               <a:rPr lang="ko-KR" altLang="en-US" dirty="0" smtClean="0"/>
-              <a:t>출고부품 담기 </a:t>
-            </a:r>
-            <a:r>
-              <a:rPr lang="en-US" altLang="ko-KR" dirty="0" smtClean="0"/>
-              <a:t>(</a:t>
+              <a:t>출고부품 </a:t>
             </a:r>
             <a:r>
               <a:rPr lang="ko-KR" altLang="en-US" dirty="0" smtClean="0"/>
-              <a:t>장바구니 담기</a:t>
-            </a:r>
-            <a:r>
-              <a:rPr lang="en-US" altLang="ko-KR" dirty="0" smtClean="0"/>
-              <a:t>)</a:t>
+              <a:t>담</a:t>
+            </a:r>
+            <a:r>
+              <a:rPr lang="ko-KR" altLang="en-US" dirty="0"/>
+              <a:t>기</a:t>
             </a:r>
             <a:endParaRPr lang="ko-KR" altLang="en-US" dirty="0"/>
           </a:p>
@@ -3061,18 +3042,22 @@
             </a:r>
             <a:r>
               <a:rPr lang="en-US" altLang="ko-KR" dirty="0" smtClean="0"/>
-              <a:t>Cart(</a:t>
+              <a:t>Cart</a:t>
+            </a:r>
+            <a:r>
+              <a:rPr lang="en-US" altLang="ko-KR" dirty="0" smtClean="0"/>
+              <a:t>(</a:t>
             </a:r>
             <a:r>
               <a:rPr lang="ko-KR" altLang="en-US" dirty="0" smtClean="0"/>
-              <a:t>장바구니</a:t>
+              <a:t>출고준비</a:t>
             </a:r>
             <a:r>
               <a:rPr lang="en-US" altLang="ko-KR" dirty="0" smtClean="0"/>
               <a:t>)</a:t>
             </a:r>
             <a:r>
-              <a:rPr lang="ko-KR" altLang="en-US" dirty="0"/>
+              <a:rPr lang="ko-KR" altLang="en-US" dirty="0" smtClean="0"/>
               <a:t> </a:t>
             </a:r>
             <a:r>
@@ -3375,23 +3360,11 @@
           <a:p>
             <a:r>
               <a:rPr lang="ko-KR" altLang="en-US" dirty="0" smtClean="0"/>
-              <a:t>출고요청 부품리스트 보기</a:t>
-            </a:r>
-            <a:r>
-              <a:rPr lang="en-US" altLang="ko-KR" dirty="0"/>
-              <a:t> </a:t>
-            </a:r>
-            <a:r>
-              <a:rPr lang="en-US" altLang="ko-KR" dirty="0" smtClean="0"/>
-              <a:t>(</a:t>
+              <a:t>출고요청 부품리스트 </a:t>
             </a:r>
             <a:r>
               <a:rPr lang="ko-KR" altLang="en-US" dirty="0" smtClean="0"/>
-              <a:t>장바구니 확인</a:t>
-            </a:r>
-            <a:r>
-              <a:rPr lang="en-US" altLang="ko-KR" dirty="0" smtClean="0"/>
-              <a:t>)</a:t>
+              <a:t>보기</a:t>
             </a:r>
             <a:endParaRPr lang="ko-KR" altLang="en-US" dirty="0"/>
           </a:p>
@@ -7920,15 +7893,7 @@
           <a:p>
             <a:r>
               <a:rPr lang="ko-KR" altLang="en-US" dirty="0" smtClean="0"/>
-              <a:t>출고요청 결과를 </a:t>
-            </a:r>
-            <a:r>
-              <a:rPr lang="ko-KR" altLang="en-US" dirty="0" smtClean="0"/>
-              <a:t>개발자도 동시에 </a:t>
-            </a:r>
-            <a:r>
-              <a:rPr lang="ko-KR" altLang="en-US" dirty="0" smtClean="0"/>
-              <a:t>확인가능</a:t>
+              <a:t>출고요청 결과를 개발자도 동시에 확인가능</a:t>
             </a:r>
             <a:endParaRPr lang="ko-KR" altLang="en-US" dirty="0"/>
           </a:p>
@@ -21060,7 +21025,7 @@
         </p:blipFill>
         <p:spPr bwMode="auto">
           <a:xfrm>
-            <a:off x="703734" y="1604127"/>
+            <a:off x="703734" y="1484784"/>
             <a:ext cx="8252319" cy="2688969"/>
           </a:xfrm>
           <a:prstGeom prst="rect">
@@ -21103,242 +21068,13 @@
       </p:pic>
       <p:sp>
         <p:nvSpPr>
-          <p:cNvPr id="4" name="직사각형 3"/>
-          <p:cNvSpPr/>
-          <p:nvPr/>
-        </p:nvSpPr>
-        <p:spPr>
-          <a:xfrm>
-            <a:off x="142574" y="4365104"/>
-            <a:ext cx="9706176" cy="2062103"/>
-          </a:xfrm>
-          <a:prstGeom prst="rect">
-            <a:avLst/>
-          </a:prstGeom>
-        </p:spPr>
-        <p:txBody>
-          <a:bodyPr wrap="square">
-            <a:spAutoFit/>
-          </a:bodyPr>
-          <a:lstStyle/>
-          <a:p>
-            <a:r>
-              <a:rPr lang="en-US" altLang="ko-KR" sz="1600" dirty="0"/>
-              <a:t>STATE 1 : </a:t>
-            </a:r>
-            <a:r>
-              <a:rPr lang="ko-KR" altLang="en-US" sz="1600" dirty="0"/>
-              <a:t>요청서 </a:t>
-            </a:r>
-            <a:r>
-              <a:rPr lang="ko-KR" altLang="en-US" sz="1600" dirty="0" err="1"/>
-              <a:t>작성중</a:t>
-            </a:r>
-            <a:r>
-              <a:rPr lang="ko-KR" altLang="en-US" sz="1600" dirty="0"/>
-              <a:t> </a:t>
-            </a:r>
-            <a:r>
-              <a:rPr lang="en-US" altLang="ko-KR" sz="1600" dirty="0"/>
-              <a:t>- </a:t>
-            </a:r>
-            <a:r>
-              <a:rPr lang="ko-KR" altLang="en-US" sz="1600" dirty="0"/>
-              <a:t>개발담당자가 부품리스트를 추가삭제 및 수량변경 할 수 있음</a:t>
-            </a:r>
-            <a:r>
-              <a:rPr lang="en-US" altLang="ko-KR" sz="1600" dirty="0"/>
-              <a:t>.</a:t>
-            </a:r>
-            <a:br>
-              <a:rPr lang="en-US" altLang="ko-KR" sz="1600" dirty="0"/>
-            </a:br>
-            <a:r>
-              <a:rPr lang="en-US" altLang="ko-KR" sz="1600" dirty="0"/>
-              <a:t>                </a:t>
-            </a:r>
-            <a:r>
-              <a:rPr lang="ko-KR" altLang="en-US" sz="1600" dirty="0" err="1"/>
-              <a:t>출고요청하면</a:t>
-            </a:r>
-            <a:r>
-              <a:rPr lang="ko-KR" altLang="en-US" sz="1600" dirty="0"/>
-              <a:t> 출고담당자에게 작성내용이 넘어감</a:t>
-            </a:r>
-            <a:br>
-              <a:rPr lang="ko-KR" altLang="en-US" sz="1600" dirty="0"/>
-            </a:br>
-            <a:r>
-              <a:rPr lang="ko-KR" altLang="en-US" sz="1600" dirty="0"/>
-              <a:t>                부품수량 </a:t>
-            </a:r>
-            <a:r>
-              <a:rPr lang="ko-KR" altLang="en-US" sz="1600" dirty="0" err="1"/>
-              <a:t>여러건을</a:t>
-            </a:r>
-            <a:r>
-              <a:rPr lang="ko-KR" altLang="en-US" sz="1600" dirty="0"/>
-              <a:t> 출고요청 </a:t>
-            </a:r>
-            <a:r>
-              <a:rPr lang="en-US" altLang="ko-KR" sz="1600" dirty="0"/>
-              <a:t>1</a:t>
-            </a:r>
-            <a:r>
-              <a:rPr lang="ko-KR" altLang="en-US" sz="1600" dirty="0"/>
-              <a:t>건으로 진행할 수 있음</a:t>
-            </a:r>
-          </a:p>
-          <a:p>
-            <a:r>
-              <a:rPr lang="en-US" altLang="ko-KR" sz="1600" dirty="0"/>
-              <a:t>STATE 2 : </a:t>
-            </a:r>
-            <a:r>
-              <a:rPr lang="ko-KR" altLang="en-US" sz="1600" dirty="0" err="1"/>
-              <a:t>합의요청중</a:t>
-            </a:r>
-            <a:r>
-              <a:rPr lang="ko-KR" altLang="en-US" sz="1600" dirty="0"/>
-              <a:t> </a:t>
-            </a:r>
-            <a:r>
-              <a:rPr lang="en-US" altLang="ko-KR" sz="1600" dirty="0"/>
-              <a:t>- </a:t>
-            </a:r>
-            <a:r>
-              <a:rPr lang="ko-KR" altLang="en-US" sz="1600" dirty="0"/>
-              <a:t>동료개발자가 승인해야 </a:t>
-            </a:r>
-            <a:r>
-              <a:rPr lang="ko-KR" altLang="en-US" sz="1600" dirty="0" err="1"/>
-              <a:t>출고진행함</a:t>
-            </a:r>
-            <a:r>
-              <a:rPr lang="en-US" altLang="ko-KR" sz="1600" dirty="0"/>
-              <a:t>. </a:t>
-            </a:r>
-            <a:r>
-              <a:rPr lang="ko-KR" altLang="en-US" sz="1600" dirty="0" err="1"/>
-              <a:t>승인시</a:t>
-            </a:r>
-            <a:r>
-              <a:rPr lang="ko-KR" altLang="en-US" sz="1600" dirty="0"/>
-              <a:t> 출고담당자에게 리스트가 넘어감</a:t>
-            </a:r>
-            <a:r>
-              <a:rPr lang="en-US" altLang="ko-KR" sz="1600" dirty="0"/>
-              <a:t>.</a:t>
-            </a:r>
-          </a:p>
-          <a:p>
-            <a:r>
-              <a:rPr lang="en-US" altLang="ko-KR" sz="1600" dirty="0"/>
-              <a:t>STATE 3 : </a:t>
-            </a:r>
-            <a:r>
-              <a:rPr lang="ko-KR" altLang="en-US" sz="1600" dirty="0" err="1"/>
-              <a:t>출고접수중</a:t>
-            </a:r>
-            <a:r>
-              <a:rPr lang="ko-KR" altLang="en-US" sz="1600" dirty="0"/>
-              <a:t> </a:t>
-            </a:r>
-            <a:r>
-              <a:rPr lang="en-US" altLang="ko-KR" sz="1600" dirty="0"/>
-              <a:t>- </a:t>
-            </a:r>
-            <a:r>
-              <a:rPr lang="ko-KR" altLang="en-US" sz="1600" dirty="0"/>
-              <a:t>출고담당자가 확인하고 프린트를 </a:t>
-            </a:r>
-            <a:r>
-              <a:rPr lang="ko-KR" altLang="en-US" sz="1600" dirty="0" err="1"/>
-              <a:t>해야함</a:t>
-            </a:r>
-            <a:endParaRPr lang="ko-KR" altLang="en-US" sz="1600" dirty="0"/>
-          </a:p>
-          <a:p>
-            <a:r>
-              <a:rPr lang="en-US" altLang="ko-KR" sz="1600" dirty="0"/>
-              <a:t>STATE 4 : </a:t>
-            </a:r>
-            <a:r>
-              <a:rPr lang="ko-KR" altLang="en-US" sz="1600" dirty="0"/>
-              <a:t>출고접수완료 </a:t>
-            </a:r>
-            <a:r>
-              <a:rPr lang="en-US" altLang="ko-KR" sz="1600" dirty="0"/>
-              <a:t>- </a:t>
-            </a:r>
-            <a:r>
-              <a:rPr lang="ko-KR" altLang="en-US" sz="1600" dirty="0"/>
-              <a:t>출고담당자가 </a:t>
-            </a:r>
-            <a:r>
-              <a:rPr lang="ko-KR" altLang="en-US" sz="1600" dirty="0" err="1"/>
-              <a:t>출고완료후</a:t>
-            </a:r>
-            <a:r>
-              <a:rPr lang="ko-KR" altLang="en-US" sz="1600" dirty="0"/>
-              <a:t> 출고완료 버튼을 눌러야 함</a:t>
-            </a:r>
-          </a:p>
-          <a:p>
-            <a:r>
-              <a:rPr lang="en-US" altLang="ko-KR" sz="1600" dirty="0"/>
-              <a:t>STATE 5 : </a:t>
-            </a:r>
-            <a:r>
-              <a:rPr lang="ko-KR" altLang="en-US" sz="1600" dirty="0"/>
-              <a:t>출고완료 </a:t>
-            </a:r>
-            <a:r>
-              <a:rPr lang="en-US" altLang="ko-KR" sz="1600" dirty="0"/>
-              <a:t>- </a:t>
-            </a:r>
-            <a:r>
-              <a:rPr lang="ko-KR" altLang="en-US" sz="1600" dirty="0" err="1"/>
-              <a:t>모든작업이</a:t>
-            </a:r>
-            <a:r>
-              <a:rPr lang="ko-KR" altLang="en-US" sz="1600" dirty="0"/>
-              <a:t> 완료된 상태</a:t>
-            </a:r>
-          </a:p>
-          <a:p>
-            <a:r>
-              <a:rPr lang="en-US" altLang="ko-KR" sz="1600" dirty="0"/>
-              <a:t>STATE 6 : </a:t>
-            </a:r>
-            <a:r>
-              <a:rPr lang="ko-KR" altLang="en-US" sz="1600" dirty="0"/>
-              <a:t>반려 </a:t>
-            </a:r>
-            <a:r>
-              <a:rPr lang="en-US" altLang="ko-KR" sz="1600" dirty="0"/>
-              <a:t>- </a:t>
-            </a:r>
-            <a:r>
-              <a:rPr lang="ko-KR" altLang="en-US" sz="1600" dirty="0" err="1"/>
-              <a:t>모든작업이</a:t>
-            </a:r>
-            <a:r>
-              <a:rPr lang="ko-KR" altLang="en-US" sz="1600" dirty="0"/>
-              <a:t> 완료된 상태</a:t>
-            </a:r>
-          </a:p>
-        </p:txBody>
-      </p:sp>
-      <p:sp>
-        <p:nvSpPr>
           <p:cNvPr id="3" name="직사각형 2"/>
           <p:cNvSpPr/>
           <p:nvPr/>
         </p:nvSpPr>
         <p:spPr>
           <a:xfrm>
-            <a:off x="341408" y="980728"/>
+            <a:off x="341408" y="908720"/>
             <a:ext cx="3772186" cy="461665"/>
           </a:xfrm>
           <a:prstGeom prst="rect">
@@ -21379,6 +21115,1766 @@
               </a:rPr>
               <a:t>Machine]</a:t>
             </a:r>
+          </a:p>
+        </p:txBody>
+      </p:sp>
+      <p:graphicFrame>
+        <p:nvGraphicFramePr>
+          <p:cNvPr id="6" name="표 5"/>
+          <p:cNvGraphicFramePr>
+            <a:graphicFrameLocks noGrp="1"/>
+          </p:cNvGraphicFramePr>
+          <p:nvPr>
+            <p:extLst>
+              <p:ext uri="{D42A27DB-BD31-4B8C-83A1-F6EECF244321}">
+                <p14:modId xmlns:p14="http://schemas.microsoft.com/office/powerpoint/2010/main" val="4152233291"/>
+              </p:ext>
+            </p:extLst>
+          </p:nvPr>
+        </p:nvGraphicFramePr>
+        <p:xfrm>
+          <a:off x="343694" y="4293097"/>
+          <a:ext cx="9065499" cy="2350759"/>
+        </p:xfrm>
+        <a:graphic>
+          <a:graphicData uri="http://schemas.openxmlformats.org/drawingml/2006/table">
+            <a:tbl>
+              <a:tblPr firstRow="1">
+                <a:tableStyleId>{5C22544A-7EE6-4342-B048-85BDC9FD1C3A}</a:tableStyleId>
+              </a:tblPr>
+              <a:tblGrid>
+                <a:gridCol w="1008112"/>
+                <a:gridCol w="1152128"/>
+                <a:gridCol w="1296144"/>
+                <a:gridCol w="4608512"/>
+                <a:gridCol w="1000603"/>
+              </a:tblGrid>
+              <a:tr h="207245">
+                <a:tc>
+                  <a:txBody>
+                    <a:bodyPr/>
+                    <a:lstStyle/>
+                    <a:p>
+                      <a:pPr algn="ctr" latinLnBrk="1"/>
+                      <a:r>
+                        <a:rPr lang="en-US" altLang="ko-KR" sz="1100" b="1" kern="1200" dirty="0" smtClean="0">
+                          <a:solidFill>
+                            <a:schemeClr val="bg1"/>
+                          </a:solidFill>
+                          <a:latin typeface="HY그래픽M" pitchFamily="18" charset="-127"/>
+                          <a:ea typeface="HY그래픽M" pitchFamily="18" charset="-127"/>
+                          <a:cs typeface="+mn-cs"/>
+                        </a:rPr>
+                        <a:t>STATE</a:t>
+                      </a:r>
+                      <a:endParaRPr lang="ko-KR" altLang="en-US" sz="1100" b="1" kern="1200" dirty="0">
+                        <a:solidFill>
+                          <a:schemeClr val="bg1"/>
+                        </a:solidFill>
+                        <a:latin typeface="HY그래픽M" pitchFamily="18" charset="-127"/>
+                        <a:ea typeface="HY그래픽M" pitchFamily="18" charset="-127"/>
+                        <a:cs typeface="+mn-cs"/>
+                      </a:endParaRPr>
+                    </a:p>
+                  </a:txBody>
+                  <a:tcPr/>
+                </a:tc>
+                <a:tc>
+                  <a:txBody>
+                    <a:bodyPr/>
+                    <a:lstStyle/>
+                    <a:p>
+                      <a:pPr algn="ctr" latinLnBrk="1"/>
+                      <a:r>
+                        <a:rPr lang="en-US" altLang="ko-KR" sz="1100" b="1" kern="1200" dirty="0" smtClean="0">
+                          <a:solidFill>
+                            <a:schemeClr val="bg1"/>
+                          </a:solidFill>
+                          <a:latin typeface="HY그래픽M" pitchFamily="18" charset="-127"/>
+                          <a:ea typeface="HY그래픽M" pitchFamily="18" charset="-127"/>
+                          <a:cs typeface="+mn-cs"/>
+                        </a:rPr>
+                        <a:t>Title</a:t>
+                      </a:r>
+                      <a:endParaRPr lang="ko-KR" altLang="en-US" sz="1100" b="1" kern="1200" dirty="0">
+                        <a:solidFill>
+                          <a:schemeClr val="bg1"/>
+                        </a:solidFill>
+                        <a:latin typeface="HY그래픽M" pitchFamily="18" charset="-127"/>
+                        <a:ea typeface="HY그래픽M" pitchFamily="18" charset="-127"/>
+                        <a:cs typeface="+mn-cs"/>
+                      </a:endParaRPr>
+                    </a:p>
+                  </a:txBody>
+                  <a:tcPr/>
+                </a:tc>
+                <a:tc>
+                  <a:txBody>
+                    <a:bodyPr/>
+                    <a:lstStyle/>
+                    <a:p>
+                      <a:pPr algn="ctr" latinLnBrk="1"/>
+                      <a:r>
+                        <a:rPr lang="en-US" altLang="ko-KR" sz="1100" b="1" kern="1200" dirty="0" smtClean="0">
+                          <a:solidFill>
+                            <a:schemeClr val="bg1"/>
+                          </a:solidFill>
+                          <a:latin typeface="HY그래픽M" pitchFamily="18" charset="-127"/>
+                          <a:ea typeface="HY그래픽M" pitchFamily="18" charset="-127"/>
+                          <a:cs typeface="+mn-cs"/>
+                        </a:rPr>
+                        <a:t>Actor</a:t>
+                      </a:r>
+                      <a:endParaRPr lang="ko-KR" altLang="en-US" sz="1100" b="1" kern="1200" dirty="0">
+                        <a:solidFill>
+                          <a:schemeClr val="bg1"/>
+                        </a:solidFill>
+                        <a:latin typeface="HY그래픽M" pitchFamily="18" charset="-127"/>
+                        <a:ea typeface="HY그래픽M" pitchFamily="18" charset="-127"/>
+                        <a:cs typeface="+mn-cs"/>
+                      </a:endParaRPr>
+                    </a:p>
+                  </a:txBody>
+                  <a:tcPr/>
+                </a:tc>
+                <a:tc>
+                  <a:txBody>
+                    <a:bodyPr/>
+                    <a:lstStyle/>
+                    <a:p>
+                      <a:pPr algn="ctr" latinLnBrk="1"/>
+                      <a:r>
+                        <a:rPr lang="en-US" altLang="ko-KR" sz="1100" b="1" kern="1200" dirty="0" smtClean="0">
+                          <a:solidFill>
+                            <a:schemeClr val="bg1"/>
+                          </a:solidFill>
+                          <a:latin typeface="HY그래픽M" pitchFamily="18" charset="-127"/>
+                          <a:ea typeface="HY그래픽M" pitchFamily="18" charset="-127"/>
+                          <a:cs typeface="+mn-cs"/>
+                        </a:rPr>
+                        <a:t>Description</a:t>
+                      </a:r>
+                      <a:endParaRPr lang="ko-KR" altLang="en-US" sz="1100" b="1" kern="1200" dirty="0">
+                        <a:solidFill>
+                          <a:schemeClr val="bg1"/>
+                        </a:solidFill>
+                        <a:latin typeface="HY그래픽M" pitchFamily="18" charset="-127"/>
+                        <a:ea typeface="HY그래픽M" pitchFamily="18" charset="-127"/>
+                        <a:cs typeface="+mn-cs"/>
+                      </a:endParaRPr>
+                    </a:p>
+                  </a:txBody>
+                  <a:tcPr/>
+                </a:tc>
+                <a:tc>
+                  <a:txBody>
+                    <a:bodyPr/>
+                    <a:lstStyle/>
+                    <a:p>
+                      <a:pPr algn="ctr" latinLnBrk="1"/>
+                      <a:r>
+                        <a:rPr lang="en-US" altLang="ko-KR" sz="1100" b="1" kern="1200" dirty="0" smtClean="0">
+                          <a:solidFill>
+                            <a:schemeClr val="bg1"/>
+                          </a:solidFill>
+                          <a:latin typeface="HY그래픽M" pitchFamily="18" charset="-127"/>
+                          <a:ea typeface="HY그래픽M" pitchFamily="18" charset="-127"/>
+                          <a:cs typeface="+mn-cs"/>
+                        </a:rPr>
+                        <a:t>Memo</a:t>
+                      </a:r>
+                      <a:endParaRPr lang="ko-KR" altLang="en-US" sz="1100" b="1" kern="1200" dirty="0">
+                        <a:solidFill>
+                          <a:schemeClr val="bg1"/>
+                        </a:solidFill>
+                        <a:latin typeface="HY그래픽M" pitchFamily="18" charset="-127"/>
+                        <a:ea typeface="HY그래픽M" pitchFamily="18" charset="-127"/>
+                        <a:cs typeface="+mn-cs"/>
+                      </a:endParaRPr>
+                    </a:p>
+                  </a:txBody>
+                  <a:tcPr/>
+                </a:tc>
+              </a:tr>
+              <a:tr h="460999">
+                <a:tc>
+                  <a:txBody>
+                    <a:bodyPr/>
+                    <a:lstStyle/>
+                    <a:p>
+                      <a:pPr algn="ctr" latinLnBrk="1"/>
+                      <a:r>
+                        <a:rPr lang="en-US" altLang="ko-KR" sz="1100" b="1" kern="1200" dirty="0" smtClean="0">
+                          <a:solidFill>
+                            <a:schemeClr val="tx1"/>
+                          </a:solidFill>
+                          <a:latin typeface="HY그래픽M" pitchFamily="18" charset="-127"/>
+                          <a:ea typeface="HY그래픽M" pitchFamily="18" charset="-127"/>
+                          <a:cs typeface="+mn-cs"/>
+                        </a:rPr>
+                        <a:t>STATE 1</a:t>
+                      </a:r>
+                      <a:endParaRPr lang="ko-KR" altLang="en-US" sz="1100" b="1" kern="1200" dirty="0">
+                        <a:solidFill>
+                          <a:schemeClr val="tx1"/>
+                        </a:solidFill>
+                        <a:latin typeface="HY그래픽M" pitchFamily="18" charset="-127"/>
+                        <a:ea typeface="HY그래픽M" pitchFamily="18" charset="-127"/>
+                        <a:cs typeface="+mn-cs"/>
+                      </a:endParaRPr>
+                    </a:p>
+                  </a:txBody>
+                  <a:tcPr/>
+                </a:tc>
+                <a:tc>
+                  <a:txBody>
+                    <a:bodyPr/>
+                    <a:lstStyle/>
+                    <a:p>
+                      <a:pPr algn="ctr" latinLnBrk="1"/>
+                      <a:r>
+                        <a:rPr lang="ko-KR" altLang="en-US" sz="1100" b="1" kern="1200" dirty="0" smtClean="0">
+                          <a:solidFill>
+                            <a:schemeClr val="tx1"/>
+                          </a:solidFill>
+                          <a:latin typeface="HY그래픽M" pitchFamily="18" charset="-127"/>
+                          <a:ea typeface="HY그래픽M" pitchFamily="18" charset="-127"/>
+                          <a:cs typeface="+mn-cs"/>
+                        </a:rPr>
+                        <a:t>요청서 </a:t>
+                      </a:r>
+                      <a:r>
+                        <a:rPr lang="ko-KR" altLang="en-US" sz="1100" b="1" kern="1200" dirty="0" err="1" smtClean="0">
+                          <a:solidFill>
+                            <a:schemeClr val="tx1"/>
+                          </a:solidFill>
+                          <a:latin typeface="HY그래픽M" pitchFamily="18" charset="-127"/>
+                          <a:ea typeface="HY그래픽M" pitchFamily="18" charset="-127"/>
+                          <a:cs typeface="+mn-cs"/>
+                        </a:rPr>
+                        <a:t>작성중</a:t>
+                      </a:r>
+                      <a:endParaRPr lang="ko-KR" altLang="en-US" sz="1100" b="1" kern="1200" dirty="0">
+                        <a:solidFill>
+                          <a:schemeClr val="tx1"/>
+                        </a:solidFill>
+                        <a:latin typeface="HY그래픽M" pitchFamily="18" charset="-127"/>
+                        <a:ea typeface="HY그래픽M" pitchFamily="18" charset="-127"/>
+                        <a:cs typeface="+mn-cs"/>
+                      </a:endParaRPr>
+                    </a:p>
+                  </a:txBody>
+                  <a:tcPr/>
+                </a:tc>
+                <a:tc>
+                  <a:txBody>
+                    <a:bodyPr/>
+                    <a:lstStyle/>
+                    <a:p>
+                      <a:pPr algn="ctr" latinLnBrk="1"/>
+                      <a:r>
+                        <a:rPr lang="ko-KR" altLang="en-US" sz="1100" b="1" kern="1200" dirty="0" smtClean="0">
+                          <a:solidFill>
+                            <a:schemeClr val="tx1"/>
+                          </a:solidFill>
+                          <a:latin typeface="HY그래픽M" pitchFamily="18" charset="-127"/>
+                          <a:ea typeface="HY그래픽M" pitchFamily="18" charset="-127"/>
+                          <a:cs typeface="+mn-cs"/>
+                        </a:rPr>
+                        <a:t>개발담당자</a:t>
+                      </a:r>
+                      <a:endParaRPr lang="ko-KR" altLang="en-US" sz="1100" b="1" kern="1200" dirty="0">
+                        <a:solidFill>
+                          <a:schemeClr val="tx1"/>
+                        </a:solidFill>
+                        <a:latin typeface="HY그래픽M" pitchFamily="18" charset="-127"/>
+                        <a:ea typeface="HY그래픽M" pitchFamily="18" charset="-127"/>
+                        <a:cs typeface="+mn-cs"/>
+                      </a:endParaRPr>
+                    </a:p>
+                  </a:txBody>
+                  <a:tcPr/>
+                </a:tc>
+                <a:tc>
+                  <a:txBody>
+                    <a:bodyPr/>
+                    <a:lstStyle/>
+                    <a:p>
+                      <a:pPr latinLnBrk="1"/>
+                      <a:r>
+                        <a:rPr lang="ko-KR" altLang="en-US" sz="1100" b="1" kern="1200" dirty="0" smtClean="0">
+                          <a:solidFill>
+                            <a:schemeClr val="tx1"/>
+                          </a:solidFill>
+                          <a:latin typeface="HY그래픽M" pitchFamily="18" charset="-127"/>
+                          <a:ea typeface="HY그래픽M" pitchFamily="18" charset="-127"/>
+                          <a:cs typeface="+mn-cs"/>
+                        </a:rPr>
+                        <a:t>부품리스트를 추가삭제 및 수량변경 할 수 있음</a:t>
+                      </a:r>
+                      <a:r>
+                        <a:rPr lang="en-US" altLang="ko-KR" sz="1100" b="1" kern="1200" dirty="0" smtClean="0">
+                          <a:solidFill>
+                            <a:schemeClr val="tx1"/>
+                          </a:solidFill>
+                          <a:latin typeface="HY그래픽M" pitchFamily="18" charset="-127"/>
+                          <a:ea typeface="HY그래픽M" pitchFamily="18" charset="-127"/>
+                          <a:cs typeface="+mn-cs"/>
+                        </a:rPr>
+                        <a:t>.</a:t>
+                      </a:r>
+                      <a:br>
+                        <a:rPr lang="en-US" altLang="ko-KR" sz="1100" b="1" kern="1200" dirty="0" smtClean="0">
+                          <a:solidFill>
+                            <a:schemeClr val="tx1"/>
+                          </a:solidFill>
+                          <a:latin typeface="HY그래픽M" pitchFamily="18" charset="-127"/>
+                          <a:ea typeface="HY그래픽M" pitchFamily="18" charset="-127"/>
+                          <a:cs typeface="+mn-cs"/>
+                        </a:rPr>
+                      </a:br>
+                      <a:r>
+                        <a:rPr lang="ko-KR" altLang="en-US" sz="1100" b="1" kern="1200" dirty="0" err="1" smtClean="0">
+                          <a:solidFill>
+                            <a:schemeClr val="tx1"/>
+                          </a:solidFill>
+                          <a:latin typeface="HY그래픽M" pitchFamily="18" charset="-127"/>
+                          <a:ea typeface="HY그래픽M" pitchFamily="18" charset="-127"/>
+                          <a:cs typeface="+mn-cs"/>
+                        </a:rPr>
+                        <a:t>출고요청하면</a:t>
+                      </a:r>
+                      <a:r>
+                        <a:rPr lang="ko-KR" altLang="en-US" sz="1100" b="1" kern="1200" dirty="0" smtClean="0">
+                          <a:solidFill>
+                            <a:schemeClr val="tx1"/>
+                          </a:solidFill>
+                          <a:latin typeface="HY그래픽M" pitchFamily="18" charset="-127"/>
+                          <a:ea typeface="HY그래픽M" pitchFamily="18" charset="-127"/>
+                          <a:cs typeface="+mn-cs"/>
+                        </a:rPr>
+                        <a:t> 출고담당자에게 작성내용이 넘어감</a:t>
+                      </a:r>
+                      <a:endParaRPr lang="ko-KR" altLang="en-US" sz="1100" b="1" kern="1200" dirty="0">
+                        <a:solidFill>
+                          <a:schemeClr val="tx1"/>
+                        </a:solidFill>
+                        <a:latin typeface="HY그래픽M" pitchFamily="18" charset="-127"/>
+                        <a:ea typeface="HY그래픽M" pitchFamily="18" charset="-127"/>
+                        <a:cs typeface="+mn-cs"/>
+                      </a:endParaRPr>
+                    </a:p>
+                  </a:txBody>
+                  <a:tcPr/>
+                </a:tc>
+                <a:tc>
+                  <a:txBody>
+                    <a:bodyPr/>
+                    <a:lstStyle/>
+                    <a:p>
+                      <a:pPr algn="ctr" latinLnBrk="1"/>
+                      <a:r>
+                        <a:rPr lang="ko-KR" altLang="en-US" sz="1100" b="1" kern="1200" dirty="0" smtClean="0">
+                          <a:solidFill>
+                            <a:schemeClr val="tx1"/>
+                          </a:solidFill>
+                          <a:latin typeface="HY그래픽M" pitchFamily="18" charset="-127"/>
+                          <a:ea typeface="HY그래픽M" pitchFamily="18" charset="-127"/>
+                          <a:cs typeface="+mn-cs"/>
+                        </a:rPr>
+                        <a:t>시작</a:t>
+                      </a:r>
+                      <a:endParaRPr lang="ko-KR" altLang="en-US" sz="1100" b="1" kern="1200" dirty="0">
+                        <a:solidFill>
+                          <a:schemeClr val="tx1"/>
+                        </a:solidFill>
+                        <a:latin typeface="HY그래픽M" pitchFamily="18" charset="-127"/>
+                        <a:ea typeface="HY그래픽M" pitchFamily="18" charset="-127"/>
+                        <a:cs typeface="+mn-cs"/>
+                      </a:endParaRPr>
+                    </a:p>
+                  </a:txBody>
+                  <a:tcPr/>
+                </a:tc>
+              </a:tr>
+              <a:tr h="425846">
+                <a:tc>
+                  <a:txBody>
+                    <a:bodyPr/>
+                    <a:lstStyle/>
+                    <a:p>
+                      <a:pPr algn="ctr" latinLnBrk="1"/>
+                      <a:r>
+                        <a:rPr lang="en-US" altLang="ko-KR" sz="1100" b="1" kern="1200" dirty="0" smtClean="0">
+                          <a:solidFill>
+                            <a:schemeClr val="tx1"/>
+                          </a:solidFill>
+                          <a:latin typeface="HY그래픽M" pitchFamily="18" charset="-127"/>
+                          <a:ea typeface="HY그래픽M" pitchFamily="18" charset="-127"/>
+                          <a:cs typeface="+mn-cs"/>
+                        </a:rPr>
+                        <a:t>STATE 2</a:t>
+                      </a:r>
+                      <a:endParaRPr lang="ko-KR" altLang="en-US" sz="1100" b="1" kern="1200" dirty="0">
+                        <a:solidFill>
+                          <a:schemeClr val="tx1"/>
+                        </a:solidFill>
+                        <a:latin typeface="HY그래픽M" pitchFamily="18" charset="-127"/>
+                        <a:ea typeface="HY그래픽M" pitchFamily="18" charset="-127"/>
+                        <a:cs typeface="+mn-cs"/>
+                      </a:endParaRPr>
+                    </a:p>
+                  </a:txBody>
+                  <a:tcPr/>
+                </a:tc>
+                <a:tc>
+                  <a:txBody>
+                    <a:bodyPr/>
+                    <a:lstStyle/>
+                    <a:p>
+                      <a:pPr algn="ctr" latinLnBrk="1"/>
+                      <a:r>
+                        <a:rPr lang="ko-KR" altLang="en-US" sz="1100" b="1" kern="1200" dirty="0" err="1" smtClean="0">
+                          <a:solidFill>
+                            <a:schemeClr val="tx1"/>
+                          </a:solidFill>
+                          <a:latin typeface="HY그래픽M" pitchFamily="18" charset="-127"/>
+                          <a:ea typeface="HY그래픽M" pitchFamily="18" charset="-127"/>
+                          <a:cs typeface="+mn-cs"/>
+                        </a:rPr>
+                        <a:t>합의요청중</a:t>
+                      </a:r>
+                      <a:endParaRPr lang="ko-KR" altLang="en-US" sz="1100" b="1" kern="1200" dirty="0">
+                        <a:solidFill>
+                          <a:schemeClr val="tx1"/>
+                        </a:solidFill>
+                        <a:latin typeface="HY그래픽M" pitchFamily="18" charset="-127"/>
+                        <a:ea typeface="HY그래픽M" pitchFamily="18" charset="-127"/>
+                        <a:cs typeface="+mn-cs"/>
+                      </a:endParaRPr>
+                    </a:p>
+                  </a:txBody>
+                  <a:tcPr/>
+                </a:tc>
+                <a:tc>
+                  <a:txBody>
+                    <a:bodyPr/>
+                    <a:lstStyle/>
+                    <a:p>
+                      <a:pPr algn="ctr" latinLnBrk="1"/>
+                      <a:r>
+                        <a:rPr lang="ko-KR" altLang="en-US" sz="1100" b="1" kern="1200" dirty="0" smtClean="0">
+                          <a:solidFill>
+                            <a:schemeClr val="tx1"/>
+                          </a:solidFill>
+                          <a:latin typeface="HY그래픽M" pitchFamily="18" charset="-127"/>
+                          <a:ea typeface="HY그래픽M" pitchFamily="18" charset="-127"/>
+                          <a:cs typeface="+mn-cs"/>
+                        </a:rPr>
+                        <a:t>개발담당자</a:t>
+                      </a:r>
+                      <a:endParaRPr lang="en-US" altLang="ko-KR" sz="1100" b="1" kern="1200" dirty="0" smtClean="0">
+                        <a:solidFill>
+                          <a:schemeClr val="tx1"/>
+                        </a:solidFill>
+                        <a:latin typeface="HY그래픽M" pitchFamily="18" charset="-127"/>
+                        <a:ea typeface="HY그래픽M" pitchFamily="18" charset="-127"/>
+                        <a:cs typeface="+mn-cs"/>
+                      </a:endParaRPr>
+                    </a:p>
+                    <a:p>
+                      <a:pPr algn="ctr" latinLnBrk="1"/>
+                      <a:r>
+                        <a:rPr lang="en-US" altLang="ko-KR" sz="1100" b="1" kern="1200" dirty="0" smtClean="0">
+                          <a:solidFill>
+                            <a:schemeClr val="tx1"/>
+                          </a:solidFill>
+                          <a:latin typeface="HY그래픽M" pitchFamily="18" charset="-127"/>
+                          <a:ea typeface="HY그래픽M" pitchFamily="18" charset="-127"/>
+                          <a:cs typeface="+mn-cs"/>
+                        </a:rPr>
+                        <a:t>(</a:t>
+                      </a:r>
+                      <a:r>
+                        <a:rPr lang="ko-KR" altLang="en-US" sz="1100" b="1" kern="1200" dirty="0" smtClean="0">
+                          <a:solidFill>
+                            <a:schemeClr val="tx1"/>
+                          </a:solidFill>
+                          <a:latin typeface="HY그래픽M" pitchFamily="18" charset="-127"/>
+                          <a:ea typeface="HY그래픽M" pitchFamily="18" charset="-127"/>
+                          <a:cs typeface="+mn-cs"/>
+                        </a:rPr>
+                        <a:t>동료개발자</a:t>
+                      </a:r>
+                      <a:r>
+                        <a:rPr lang="en-US" altLang="ko-KR" sz="1100" b="1" kern="1200" dirty="0" smtClean="0">
+                          <a:solidFill>
+                            <a:schemeClr val="tx1"/>
+                          </a:solidFill>
+                          <a:latin typeface="HY그래픽M" pitchFamily="18" charset="-127"/>
+                          <a:ea typeface="HY그래픽M" pitchFamily="18" charset="-127"/>
+                          <a:cs typeface="+mn-cs"/>
+                        </a:rPr>
+                        <a:t>)</a:t>
+                      </a:r>
+                      <a:endParaRPr lang="ko-KR" altLang="en-US" sz="1100" b="1" kern="1200" dirty="0">
+                        <a:solidFill>
+                          <a:schemeClr val="tx1"/>
+                        </a:solidFill>
+                        <a:latin typeface="HY그래픽M" pitchFamily="18" charset="-127"/>
+                        <a:ea typeface="HY그래픽M" pitchFamily="18" charset="-127"/>
+                        <a:cs typeface="+mn-cs"/>
+                      </a:endParaRPr>
+                    </a:p>
+                  </a:txBody>
+                  <a:tcPr/>
+                </a:tc>
+                <a:tc>
+                  <a:txBody>
+                    <a:bodyPr/>
+                    <a:lstStyle/>
+                    <a:p>
+                      <a:r>
+                        <a:rPr lang="en-US" altLang="ko-KR" sz="1100" b="1" kern="1200" dirty="0" smtClean="0">
+                          <a:solidFill>
+                            <a:schemeClr val="tx1"/>
+                          </a:solidFill>
+                          <a:latin typeface="HY그래픽M" pitchFamily="18" charset="-127"/>
+                          <a:ea typeface="HY그래픽M" pitchFamily="18" charset="-127"/>
+                          <a:cs typeface="+mn-cs"/>
+                        </a:rPr>
+                        <a:t>(Optional) </a:t>
+                      </a:r>
+                      <a:r>
+                        <a:rPr lang="ko-KR" altLang="en-US" sz="1100" b="1" kern="1200" dirty="0" smtClean="0">
+                          <a:solidFill>
+                            <a:schemeClr val="tx1"/>
+                          </a:solidFill>
+                          <a:latin typeface="HY그래픽M" pitchFamily="18" charset="-127"/>
+                          <a:ea typeface="HY그래픽M" pitchFamily="18" charset="-127"/>
+                          <a:cs typeface="+mn-cs"/>
+                        </a:rPr>
+                        <a:t>동료개발자가 승인해야 </a:t>
+                      </a:r>
+                      <a:r>
+                        <a:rPr lang="ko-KR" altLang="en-US" sz="1100" b="1" kern="1200" dirty="0" err="1" smtClean="0">
+                          <a:solidFill>
+                            <a:schemeClr val="tx1"/>
+                          </a:solidFill>
+                          <a:latin typeface="HY그래픽M" pitchFamily="18" charset="-127"/>
+                          <a:ea typeface="HY그래픽M" pitchFamily="18" charset="-127"/>
+                          <a:cs typeface="+mn-cs"/>
+                        </a:rPr>
+                        <a:t>출고진행함</a:t>
+                      </a:r>
+                      <a:r>
+                        <a:rPr lang="en-US" altLang="ko-KR" sz="1100" b="1" kern="1200" dirty="0" smtClean="0">
+                          <a:solidFill>
+                            <a:schemeClr val="tx1"/>
+                          </a:solidFill>
+                          <a:latin typeface="HY그래픽M" pitchFamily="18" charset="-127"/>
+                          <a:ea typeface="HY그래픽M" pitchFamily="18" charset="-127"/>
+                          <a:cs typeface="+mn-cs"/>
+                        </a:rPr>
+                        <a:t>. </a:t>
+                      </a:r>
+                    </a:p>
+                    <a:p>
+                      <a:r>
+                        <a:rPr lang="ko-KR" altLang="en-US" sz="1100" b="1" kern="1200" dirty="0" err="1" smtClean="0">
+                          <a:solidFill>
+                            <a:schemeClr val="tx1"/>
+                          </a:solidFill>
+                          <a:latin typeface="HY그래픽M" pitchFamily="18" charset="-127"/>
+                          <a:ea typeface="HY그래픽M" pitchFamily="18" charset="-127"/>
+                          <a:cs typeface="+mn-cs"/>
+                        </a:rPr>
+                        <a:t>승인시</a:t>
+                      </a:r>
+                      <a:r>
+                        <a:rPr lang="ko-KR" altLang="en-US" sz="1100" b="1" kern="1200" dirty="0" smtClean="0">
+                          <a:solidFill>
+                            <a:schemeClr val="tx1"/>
+                          </a:solidFill>
+                          <a:latin typeface="HY그래픽M" pitchFamily="18" charset="-127"/>
+                          <a:ea typeface="HY그래픽M" pitchFamily="18" charset="-127"/>
+                          <a:cs typeface="+mn-cs"/>
+                        </a:rPr>
+                        <a:t> 출고담당자에게 리스트가 넘어감</a:t>
+                      </a:r>
+                      <a:r>
+                        <a:rPr lang="en-US" altLang="ko-KR" sz="1100" b="1" kern="1200" dirty="0" smtClean="0">
+                          <a:solidFill>
+                            <a:schemeClr val="tx1"/>
+                          </a:solidFill>
+                          <a:latin typeface="HY그래픽M" pitchFamily="18" charset="-127"/>
+                          <a:ea typeface="HY그래픽M" pitchFamily="18" charset="-127"/>
+                          <a:cs typeface="+mn-cs"/>
+                        </a:rPr>
+                        <a:t>.</a:t>
+                      </a:r>
+                      <a:endParaRPr lang="ko-KR" altLang="en-US" sz="1100" b="1" kern="1200" dirty="0">
+                        <a:solidFill>
+                          <a:schemeClr val="tx1"/>
+                        </a:solidFill>
+                        <a:latin typeface="HY그래픽M" pitchFamily="18" charset="-127"/>
+                        <a:ea typeface="HY그래픽M" pitchFamily="18" charset="-127"/>
+                        <a:cs typeface="+mn-cs"/>
+                      </a:endParaRPr>
+                    </a:p>
+                  </a:txBody>
+                  <a:tcPr/>
+                </a:tc>
+                <a:tc>
+                  <a:txBody>
+                    <a:bodyPr/>
+                    <a:lstStyle/>
+                    <a:p>
+                      <a:pPr algn="ctr" latinLnBrk="1"/>
+                      <a:endParaRPr lang="ko-KR" altLang="en-US" sz="1100" b="1" kern="1200" dirty="0">
+                        <a:solidFill>
+                          <a:schemeClr val="tx1"/>
+                        </a:solidFill>
+                        <a:latin typeface="HY그래픽M" pitchFamily="18" charset="-127"/>
+                        <a:ea typeface="HY그래픽M" pitchFamily="18" charset="-127"/>
+                        <a:cs typeface="+mn-cs"/>
+                      </a:endParaRPr>
+                    </a:p>
+                  </a:txBody>
+                  <a:tcPr/>
+                </a:tc>
+              </a:tr>
+              <a:tr h="207245">
+                <a:tc>
+                  <a:txBody>
+                    <a:bodyPr/>
+                    <a:lstStyle/>
+                    <a:p>
+                      <a:pPr algn="ctr" latinLnBrk="1"/>
+                      <a:r>
+                        <a:rPr lang="en-US" altLang="ko-KR" sz="1100" b="1" kern="1200" dirty="0" smtClean="0">
+                          <a:solidFill>
+                            <a:schemeClr val="tx1"/>
+                          </a:solidFill>
+                          <a:latin typeface="HY그래픽M" pitchFamily="18" charset="-127"/>
+                          <a:ea typeface="HY그래픽M" pitchFamily="18" charset="-127"/>
+                          <a:cs typeface="+mn-cs"/>
+                        </a:rPr>
+                        <a:t>STATE 3</a:t>
+                      </a:r>
+                      <a:endParaRPr lang="ko-KR" altLang="en-US" sz="1100" b="1" kern="1200" dirty="0">
+                        <a:solidFill>
+                          <a:schemeClr val="tx1"/>
+                        </a:solidFill>
+                        <a:latin typeface="HY그래픽M" pitchFamily="18" charset="-127"/>
+                        <a:ea typeface="HY그래픽M" pitchFamily="18" charset="-127"/>
+                        <a:cs typeface="+mn-cs"/>
+                      </a:endParaRPr>
+                    </a:p>
+                  </a:txBody>
+                  <a:tcPr/>
+                </a:tc>
+                <a:tc>
+                  <a:txBody>
+                    <a:bodyPr/>
+                    <a:lstStyle/>
+                    <a:p>
+                      <a:pPr algn="ctr" latinLnBrk="1"/>
+                      <a:r>
+                        <a:rPr lang="ko-KR" altLang="en-US" sz="1100" b="1" kern="1200" dirty="0" err="1" smtClean="0">
+                          <a:solidFill>
+                            <a:schemeClr val="tx1"/>
+                          </a:solidFill>
+                          <a:latin typeface="HY그래픽M" pitchFamily="18" charset="-127"/>
+                          <a:ea typeface="HY그래픽M" pitchFamily="18" charset="-127"/>
+                          <a:cs typeface="+mn-cs"/>
+                        </a:rPr>
+                        <a:t>출고접수중</a:t>
+                      </a:r>
+                      <a:endParaRPr lang="ko-KR" altLang="en-US" sz="1100" b="1" kern="1200" dirty="0">
+                        <a:solidFill>
+                          <a:schemeClr val="tx1"/>
+                        </a:solidFill>
+                        <a:latin typeface="HY그래픽M" pitchFamily="18" charset="-127"/>
+                        <a:ea typeface="HY그래픽M" pitchFamily="18" charset="-127"/>
+                        <a:cs typeface="+mn-cs"/>
+                      </a:endParaRPr>
+                    </a:p>
+                  </a:txBody>
+                  <a:tcPr/>
+                </a:tc>
+                <a:tc>
+                  <a:txBody>
+                    <a:bodyPr/>
+                    <a:lstStyle/>
+                    <a:p>
+                      <a:pPr algn="ctr" latinLnBrk="1"/>
+                      <a:r>
+                        <a:rPr lang="ko-KR" altLang="en-US" sz="1100" b="1" kern="1200" dirty="0" smtClean="0">
+                          <a:solidFill>
+                            <a:schemeClr val="tx1"/>
+                          </a:solidFill>
+                          <a:latin typeface="HY그래픽M" pitchFamily="18" charset="-127"/>
+                          <a:ea typeface="HY그래픽M" pitchFamily="18" charset="-127"/>
+                          <a:cs typeface="+mn-cs"/>
+                        </a:rPr>
+                        <a:t>출고담당자</a:t>
+                      </a:r>
+                      <a:endParaRPr lang="ko-KR" altLang="en-US" sz="1100" b="1" kern="1200" dirty="0">
+                        <a:solidFill>
+                          <a:schemeClr val="tx1"/>
+                        </a:solidFill>
+                        <a:latin typeface="HY그래픽M" pitchFamily="18" charset="-127"/>
+                        <a:ea typeface="HY그래픽M" pitchFamily="18" charset="-127"/>
+                        <a:cs typeface="+mn-cs"/>
+                      </a:endParaRPr>
+                    </a:p>
+                  </a:txBody>
+                  <a:tcPr/>
+                </a:tc>
+                <a:tc>
+                  <a:txBody>
+                    <a:bodyPr/>
+                    <a:lstStyle/>
+                    <a:p>
+                      <a:pPr marL="0" marR="0" indent="0" algn="l" defTabSz="914400" rtl="0" eaLnBrk="1" fontAlgn="auto" latinLnBrk="1" hangingPunct="1">
+                        <a:lnSpc>
+                          <a:spcPct val="100000"/>
+                        </a:lnSpc>
+                        <a:spcBef>
+                          <a:spcPts val="0"/>
+                        </a:spcBef>
+                        <a:spcAft>
+                          <a:spcPts val="0"/>
+                        </a:spcAft>
+                        <a:buClrTx/>
+                        <a:buSzTx/>
+                        <a:buFontTx/>
+                        <a:buNone/>
+                        <a:tabLst/>
+                        <a:defRPr/>
+                      </a:pPr>
+                      <a:r>
+                        <a:rPr lang="ko-KR" altLang="en-US" sz="1100" b="1" kern="1200" dirty="0" smtClean="0">
+                          <a:solidFill>
+                            <a:schemeClr val="tx1"/>
+                          </a:solidFill>
+                          <a:latin typeface="HY그래픽M" pitchFamily="18" charset="-127"/>
+                          <a:ea typeface="HY그래픽M" pitchFamily="18" charset="-127"/>
+                          <a:cs typeface="+mn-cs"/>
+                        </a:rPr>
+                        <a:t>요청사항을 확인하고 프린트를 함</a:t>
+                      </a:r>
+                      <a:endParaRPr lang="ko-KR" altLang="en-US" sz="1100" b="1" kern="1200" dirty="0">
+                        <a:solidFill>
+                          <a:schemeClr val="tx1"/>
+                        </a:solidFill>
+                        <a:latin typeface="HY그래픽M" pitchFamily="18" charset="-127"/>
+                        <a:ea typeface="HY그래픽M" pitchFamily="18" charset="-127"/>
+                        <a:cs typeface="+mn-cs"/>
+                      </a:endParaRPr>
+                    </a:p>
+                  </a:txBody>
+                  <a:tcPr/>
+                </a:tc>
+                <a:tc>
+                  <a:txBody>
+                    <a:bodyPr/>
+                    <a:lstStyle/>
+                    <a:p>
+                      <a:pPr algn="ctr" latinLnBrk="1"/>
+                      <a:endParaRPr lang="ko-KR" altLang="en-US" sz="1100" b="1" kern="1200" dirty="0">
+                        <a:solidFill>
+                          <a:schemeClr val="tx1"/>
+                        </a:solidFill>
+                        <a:latin typeface="HY그래픽M" pitchFamily="18" charset="-127"/>
+                        <a:ea typeface="HY그래픽M" pitchFamily="18" charset="-127"/>
+                        <a:cs typeface="+mn-cs"/>
+                      </a:endParaRPr>
+                    </a:p>
+                  </a:txBody>
+                  <a:tcPr/>
+                </a:tc>
+              </a:tr>
+              <a:tr h="238474">
+                <a:tc>
+                  <a:txBody>
+                    <a:bodyPr/>
+                    <a:lstStyle/>
+                    <a:p>
+                      <a:pPr algn="ctr" latinLnBrk="1"/>
+                      <a:r>
+                        <a:rPr lang="en-US" altLang="ko-KR" sz="1100" b="1" kern="1200" dirty="0" smtClean="0">
+                          <a:solidFill>
+                            <a:schemeClr val="tx1"/>
+                          </a:solidFill>
+                          <a:latin typeface="HY그래픽M" pitchFamily="18" charset="-127"/>
+                          <a:ea typeface="HY그래픽M" pitchFamily="18" charset="-127"/>
+                          <a:cs typeface="+mn-cs"/>
+                        </a:rPr>
+                        <a:t>STATE 4 </a:t>
+                      </a:r>
+                      <a:endParaRPr lang="ko-KR" altLang="en-US" sz="1100" b="1" kern="1200" dirty="0">
+                        <a:solidFill>
+                          <a:schemeClr val="tx1"/>
+                        </a:solidFill>
+                        <a:latin typeface="HY그래픽M" pitchFamily="18" charset="-127"/>
+                        <a:ea typeface="HY그래픽M" pitchFamily="18" charset="-127"/>
+                        <a:cs typeface="+mn-cs"/>
+                      </a:endParaRPr>
+                    </a:p>
+                  </a:txBody>
+                  <a:tcPr/>
+                </a:tc>
+                <a:tc>
+                  <a:txBody>
+                    <a:bodyPr/>
+                    <a:lstStyle/>
+                    <a:p>
+                      <a:pPr algn="ctr" latinLnBrk="1"/>
+                      <a:r>
+                        <a:rPr lang="ko-KR" altLang="en-US" sz="1100" b="1" kern="1200" dirty="0" smtClean="0">
+                          <a:solidFill>
+                            <a:schemeClr val="tx1"/>
+                          </a:solidFill>
+                          <a:latin typeface="HY그래픽M" pitchFamily="18" charset="-127"/>
+                          <a:ea typeface="HY그래픽M" pitchFamily="18" charset="-127"/>
+                          <a:cs typeface="+mn-cs"/>
+                        </a:rPr>
+                        <a:t>출고접수완료</a:t>
+                      </a:r>
+                      <a:endParaRPr lang="ko-KR" altLang="en-US" sz="1100" b="1" kern="1200" dirty="0">
+                        <a:solidFill>
+                          <a:schemeClr val="tx1"/>
+                        </a:solidFill>
+                        <a:latin typeface="HY그래픽M" pitchFamily="18" charset="-127"/>
+                        <a:ea typeface="HY그래픽M" pitchFamily="18" charset="-127"/>
+                        <a:cs typeface="+mn-cs"/>
+                      </a:endParaRPr>
+                    </a:p>
+                  </a:txBody>
+                  <a:tcPr/>
+                </a:tc>
+                <a:tc>
+                  <a:txBody>
+                    <a:bodyPr/>
+                    <a:lstStyle/>
+                    <a:p>
+                      <a:pPr algn="ctr" latinLnBrk="1"/>
+                      <a:r>
+                        <a:rPr lang="ko-KR" altLang="en-US" sz="1100" b="1" kern="1200" dirty="0" smtClean="0">
+                          <a:solidFill>
+                            <a:schemeClr val="tx1"/>
+                          </a:solidFill>
+                          <a:latin typeface="HY그래픽M" pitchFamily="18" charset="-127"/>
+                          <a:ea typeface="HY그래픽M" pitchFamily="18" charset="-127"/>
+                          <a:cs typeface="+mn-cs"/>
+                        </a:rPr>
+                        <a:t>출고담당자</a:t>
+                      </a:r>
+                      <a:endParaRPr lang="ko-KR" altLang="en-US" sz="1100" b="1" kern="1200" dirty="0">
+                        <a:solidFill>
+                          <a:schemeClr val="tx1"/>
+                        </a:solidFill>
+                        <a:latin typeface="HY그래픽M" pitchFamily="18" charset="-127"/>
+                        <a:ea typeface="HY그래픽M" pitchFamily="18" charset="-127"/>
+                        <a:cs typeface="+mn-cs"/>
+                      </a:endParaRPr>
+                    </a:p>
+                  </a:txBody>
+                  <a:tcPr/>
+                </a:tc>
+                <a:tc>
+                  <a:txBody>
+                    <a:bodyPr/>
+                    <a:lstStyle/>
+                    <a:p>
+                      <a:pPr marL="0" marR="0" indent="0" algn="l" defTabSz="914400" rtl="0" eaLnBrk="1" fontAlgn="auto" latinLnBrk="1" hangingPunct="1">
+                        <a:lnSpc>
+                          <a:spcPct val="100000"/>
+                        </a:lnSpc>
+                        <a:spcBef>
+                          <a:spcPts val="0"/>
+                        </a:spcBef>
+                        <a:spcAft>
+                          <a:spcPts val="0"/>
+                        </a:spcAft>
+                        <a:buClrTx/>
+                        <a:buSzTx/>
+                        <a:buFontTx/>
+                        <a:buNone/>
+                        <a:tabLst/>
+                        <a:defRPr/>
+                      </a:pPr>
+                      <a:r>
+                        <a:rPr lang="ko-KR" altLang="en-US" sz="1100" b="1" kern="1200" dirty="0" smtClean="0">
+                          <a:solidFill>
+                            <a:schemeClr val="tx1"/>
+                          </a:solidFill>
+                          <a:latin typeface="HY그래픽M" pitchFamily="18" charset="-127"/>
+                          <a:ea typeface="HY그래픽M" pitchFamily="18" charset="-127"/>
+                          <a:cs typeface="+mn-cs"/>
+                        </a:rPr>
+                        <a:t>출고업무 </a:t>
+                      </a:r>
+                      <a:r>
+                        <a:rPr lang="ko-KR" altLang="en-US" sz="1100" b="1" kern="1200" dirty="0" err="1" smtClean="0">
+                          <a:solidFill>
+                            <a:schemeClr val="tx1"/>
+                          </a:solidFill>
+                          <a:latin typeface="HY그래픽M" pitchFamily="18" charset="-127"/>
+                          <a:ea typeface="HY그래픽M" pitchFamily="18" charset="-127"/>
+                          <a:cs typeface="+mn-cs"/>
+                        </a:rPr>
+                        <a:t>완료후</a:t>
+                      </a:r>
+                      <a:r>
+                        <a:rPr lang="ko-KR" altLang="en-US" sz="1100" b="1" kern="1200" dirty="0" smtClean="0">
+                          <a:solidFill>
+                            <a:schemeClr val="tx1"/>
+                          </a:solidFill>
+                          <a:latin typeface="HY그래픽M" pitchFamily="18" charset="-127"/>
+                          <a:ea typeface="HY그래픽M" pitchFamily="18" charset="-127"/>
+                          <a:cs typeface="+mn-cs"/>
+                        </a:rPr>
+                        <a:t> 출고완료 버튼을 눌러야 함</a:t>
+                      </a:r>
+                      <a:endParaRPr lang="en-US" altLang="ko-KR" sz="1100" b="1" kern="1200" dirty="0" smtClean="0">
+                        <a:solidFill>
+                          <a:schemeClr val="tx1"/>
+                        </a:solidFill>
+                        <a:latin typeface="HY그래픽M" pitchFamily="18" charset="-127"/>
+                        <a:ea typeface="HY그래픽M" pitchFamily="18" charset="-127"/>
+                        <a:cs typeface="+mn-cs"/>
+                      </a:endParaRPr>
+                    </a:p>
+                    <a:p>
+                      <a:pPr marL="0" marR="0" indent="0" algn="l" defTabSz="914400" rtl="0" eaLnBrk="1" fontAlgn="auto" latinLnBrk="1" hangingPunct="1">
+                        <a:lnSpc>
+                          <a:spcPct val="100000"/>
+                        </a:lnSpc>
+                        <a:spcBef>
+                          <a:spcPts val="0"/>
+                        </a:spcBef>
+                        <a:spcAft>
+                          <a:spcPts val="0"/>
+                        </a:spcAft>
+                        <a:buClrTx/>
+                        <a:buSzTx/>
+                        <a:buFontTx/>
+                        <a:buNone/>
+                        <a:tabLst/>
+                        <a:defRPr/>
+                      </a:pPr>
+                      <a:r>
+                        <a:rPr lang="ko-KR" altLang="en-US" sz="1100" b="1" kern="1200" dirty="0" smtClean="0">
+                          <a:solidFill>
+                            <a:schemeClr val="tx1"/>
+                          </a:solidFill>
+                          <a:latin typeface="HY그래픽M" pitchFamily="18" charset="-127"/>
+                          <a:ea typeface="HY그래픽M" pitchFamily="18" charset="-127"/>
+                          <a:cs typeface="+mn-cs"/>
+                        </a:rPr>
+                        <a:t>또는 반려버튼을 눌러야 함</a:t>
+                      </a:r>
+                      <a:endParaRPr lang="ko-KR" altLang="en-US" sz="1100" b="1" kern="1200" dirty="0">
+                        <a:solidFill>
+                          <a:schemeClr val="tx1"/>
+                        </a:solidFill>
+                        <a:latin typeface="HY그래픽M" pitchFamily="18" charset="-127"/>
+                        <a:ea typeface="HY그래픽M" pitchFamily="18" charset="-127"/>
+                        <a:cs typeface="+mn-cs"/>
+                      </a:endParaRPr>
+                    </a:p>
+                  </a:txBody>
+                  <a:tcPr/>
+                </a:tc>
+                <a:tc>
+                  <a:txBody>
+                    <a:bodyPr/>
+                    <a:lstStyle/>
+                    <a:p>
+                      <a:pPr algn="ctr" latinLnBrk="1"/>
+                      <a:endParaRPr lang="ko-KR" altLang="en-US" sz="1100" b="1" kern="1200" dirty="0">
+                        <a:solidFill>
+                          <a:schemeClr val="tx1"/>
+                        </a:solidFill>
+                        <a:latin typeface="HY그래픽M" pitchFamily="18" charset="-127"/>
+                        <a:ea typeface="HY그래픽M" pitchFamily="18" charset="-127"/>
+                        <a:cs typeface="+mn-cs"/>
+                      </a:endParaRPr>
+                    </a:p>
+                  </a:txBody>
+                  <a:tcPr/>
+                </a:tc>
+              </a:tr>
+              <a:tr h="207245">
+                <a:tc>
+                  <a:txBody>
+                    <a:bodyPr/>
+                    <a:lstStyle/>
+                    <a:p>
+                      <a:pPr marL="0" marR="0" indent="0" algn="ctr" defTabSz="914400" rtl="0" eaLnBrk="1" fontAlgn="auto" latinLnBrk="1" hangingPunct="1">
+                        <a:lnSpc>
+                          <a:spcPct val="100000"/>
+                        </a:lnSpc>
+                        <a:spcBef>
+                          <a:spcPts val="0"/>
+                        </a:spcBef>
+                        <a:spcAft>
+                          <a:spcPts val="0"/>
+                        </a:spcAft>
+                        <a:buClrTx/>
+                        <a:buSzTx/>
+                        <a:buFontTx/>
+                        <a:buNone/>
+                        <a:tabLst/>
+                        <a:defRPr/>
+                      </a:pPr>
+                      <a:r>
+                        <a:rPr lang="en-US" altLang="ko-KR" sz="1100" b="1" kern="1200" dirty="0" smtClean="0">
+                          <a:solidFill>
+                            <a:schemeClr val="tx1"/>
+                          </a:solidFill>
+                          <a:latin typeface="HY그래픽M" pitchFamily="18" charset="-127"/>
+                          <a:ea typeface="HY그래픽M" pitchFamily="18" charset="-127"/>
+                          <a:cs typeface="+mn-cs"/>
+                        </a:rPr>
+                        <a:t>STATE 5</a:t>
+                      </a:r>
+                      <a:endParaRPr lang="ko-KR" altLang="en-US" sz="1100" b="1" kern="1200" dirty="0">
+                        <a:solidFill>
+                          <a:schemeClr val="tx1"/>
+                        </a:solidFill>
+                        <a:latin typeface="HY그래픽M" pitchFamily="18" charset="-127"/>
+                        <a:ea typeface="HY그래픽M" pitchFamily="18" charset="-127"/>
+                        <a:cs typeface="+mn-cs"/>
+                      </a:endParaRPr>
+                    </a:p>
+                  </a:txBody>
+                  <a:tcPr/>
+                </a:tc>
+                <a:tc>
+                  <a:txBody>
+                    <a:bodyPr/>
+                    <a:lstStyle/>
+                    <a:p>
+                      <a:pPr algn="ctr" latinLnBrk="1"/>
+                      <a:r>
+                        <a:rPr lang="ko-KR" altLang="en-US" sz="1100" b="1" kern="1200" dirty="0" smtClean="0">
+                          <a:solidFill>
+                            <a:schemeClr val="tx1"/>
+                          </a:solidFill>
+                          <a:latin typeface="HY그래픽M" pitchFamily="18" charset="-127"/>
+                          <a:ea typeface="HY그래픽M" pitchFamily="18" charset="-127"/>
+                          <a:cs typeface="+mn-cs"/>
+                        </a:rPr>
+                        <a:t>출고완료 </a:t>
+                      </a:r>
+                      <a:endParaRPr lang="ko-KR" altLang="en-US" sz="1100" b="1" kern="1200" dirty="0">
+                        <a:solidFill>
+                          <a:schemeClr val="tx1"/>
+                        </a:solidFill>
+                        <a:latin typeface="HY그래픽M" pitchFamily="18" charset="-127"/>
+                        <a:ea typeface="HY그래픽M" pitchFamily="18" charset="-127"/>
+                        <a:cs typeface="+mn-cs"/>
+                      </a:endParaRPr>
+                    </a:p>
+                  </a:txBody>
+                  <a:tcPr/>
+                </a:tc>
+                <a:tc>
+                  <a:txBody>
+                    <a:bodyPr/>
+                    <a:lstStyle/>
+                    <a:p>
+                      <a:pPr algn="ctr" latinLnBrk="1"/>
+                      <a:endParaRPr lang="ko-KR" altLang="en-US" sz="1100" b="1" kern="1200" dirty="0">
+                        <a:solidFill>
+                          <a:schemeClr val="tx1"/>
+                        </a:solidFill>
+                        <a:latin typeface="HY그래픽M" pitchFamily="18" charset="-127"/>
+                        <a:ea typeface="HY그래픽M" pitchFamily="18" charset="-127"/>
+                        <a:cs typeface="+mn-cs"/>
+                      </a:endParaRPr>
+                    </a:p>
+                  </a:txBody>
+                  <a:tcPr/>
+                </a:tc>
+                <a:tc>
+                  <a:txBody>
+                    <a:bodyPr/>
+                    <a:lstStyle/>
+                    <a:p>
+                      <a:pPr marL="0" marR="0" indent="0" algn="l" defTabSz="914400" rtl="0" eaLnBrk="1" fontAlgn="auto" latinLnBrk="1" hangingPunct="1">
+                        <a:lnSpc>
+                          <a:spcPct val="100000"/>
+                        </a:lnSpc>
+                        <a:spcBef>
+                          <a:spcPts val="0"/>
+                        </a:spcBef>
+                        <a:spcAft>
+                          <a:spcPts val="0"/>
+                        </a:spcAft>
+                        <a:buClrTx/>
+                        <a:buSzTx/>
+                        <a:buFontTx/>
+                        <a:buNone/>
+                        <a:tabLst/>
+                        <a:defRPr/>
+                      </a:pPr>
+                      <a:r>
+                        <a:rPr lang="ko-KR" altLang="en-US" sz="1100" b="1" kern="1200" dirty="0" smtClean="0">
+                          <a:solidFill>
+                            <a:schemeClr val="tx1"/>
+                          </a:solidFill>
+                          <a:latin typeface="HY그래픽M" pitchFamily="18" charset="-127"/>
+                          <a:ea typeface="HY그래픽M" pitchFamily="18" charset="-127"/>
+                          <a:cs typeface="+mn-cs"/>
+                        </a:rPr>
+                        <a:t>요청에 따른 작업이 완료된 상태</a:t>
+                      </a:r>
+                      <a:r>
+                        <a:rPr lang="en-US" altLang="ko-KR" sz="1100" b="1" kern="1200" dirty="0" smtClean="0">
+                          <a:solidFill>
+                            <a:schemeClr val="tx1"/>
+                          </a:solidFill>
+                          <a:latin typeface="HY그래픽M" pitchFamily="18" charset="-127"/>
+                          <a:ea typeface="HY그래픽M" pitchFamily="18" charset="-127"/>
+                          <a:cs typeface="+mn-cs"/>
+                        </a:rPr>
+                        <a:t>. </a:t>
+                      </a:r>
+                      <a:r>
+                        <a:rPr lang="ko-KR" altLang="en-US" sz="1100" b="1" kern="1200" dirty="0" smtClean="0">
+                          <a:solidFill>
+                            <a:schemeClr val="tx1"/>
+                          </a:solidFill>
+                          <a:latin typeface="HY그래픽M" pitchFamily="18" charset="-127"/>
+                          <a:ea typeface="HY그래픽M" pitchFamily="18" charset="-127"/>
+                          <a:cs typeface="+mn-cs"/>
+                        </a:rPr>
+                        <a:t>재고가 감소되었음</a:t>
+                      </a:r>
+                      <a:r>
+                        <a:rPr lang="en-US" altLang="ko-KR" sz="1100" b="1" kern="1200" dirty="0" smtClean="0">
+                          <a:solidFill>
+                            <a:schemeClr val="tx1"/>
+                          </a:solidFill>
+                          <a:latin typeface="HY그래픽M" pitchFamily="18" charset="-127"/>
+                          <a:ea typeface="HY그래픽M" pitchFamily="18" charset="-127"/>
+                          <a:cs typeface="+mn-cs"/>
+                        </a:rPr>
+                        <a:t>.</a:t>
+                      </a:r>
+                      <a:endParaRPr lang="ko-KR" altLang="en-US" sz="1100" b="1" kern="1200" dirty="0">
+                        <a:solidFill>
+                          <a:schemeClr val="tx1"/>
+                        </a:solidFill>
+                        <a:latin typeface="HY그래픽M" pitchFamily="18" charset="-127"/>
+                        <a:ea typeface="HY그래픽M" pitchFamily="18" charset="-127"/>
+                        <a:cs typeface="+mn-cs"/>
+                      </a:endParaRPr>
+                    </a:p>
+                  </a:txBody>
+                  <a:tcPr/>
+                </a:tc>
+                <a:tc>
+                  <a:txBody>
+                    <a:bodyPr/>
+                    <a:lstStyle/>
+                    <a:p>
+                      <a:pPr algn="ctr" latinLnBrk="1"/>
+                      <a:r>
+                        <a:rPr lang="ko-KR" altLang="en-US" sz="1100" b="1" kern="1200" dirty="0" smtClean="0">
+                          <a:solidFill>
+                            <a:schemeClr val="tx1"/>
+                          </a:solidFill>
+                          <a:latin typeface="HY그래픽M" pitchFamily="18" charset="-127"/>
+                          <a:ea typeface="HY그래픽M" pitchFamily="18" charset="-127"/>
+                          <a:cs typeface="+mn-cs"/>
+                        </a:rPr>
+                        <a:t>완료</a:t>
+                      </a:r>
+                      <a:endParaRPr lang="ko-KR" altLang="en-US" sz="1100" b="1" kern="1200" dirty="0">
+                        <a:solidFill>
+                          <a:schemeClr val="tx1"/>
+                        </a:solidFill>
+                        <a:latin typeface="HY그래픽M" pitchFamily="18" charset="-127"/>
+                        <a:ea typeface="HY그래픽M" pitchFamily="18" charset="-127"/>
+                        <a:cs typeface="+mn-cs"/>
+                      </a:endParaRPr>
+                    </a:p>
+                  </a:txBody>
+                  <a:tcPr/>
+                </a:tc>
+              </a:tr>
+              <a:tr h="207245">
+                <a:tc>
+                  <a:txBody>
+                    <a:bodyPr/>
+                    <a:lstStyle/>
+                    <a:p>
+                      <a:pPr marL="0" marR="0" indent="0" algn="ctr" defTabSz="914400" rtl="0" eaLnBrk="1" fontAlgn="auto" latinLnBrk="1" hangingPunct="1">
+                        <a:lnSpc>
+                          <a:spcPct val="100000"/>
+                        </a:lnSpc>
+                        <a:spcBef>
+                          <a:spcPts val="0"/>
+                        </a:spcBef>
+                        <a:spcAft>
+                          <a:spcPts val="0"/>
+                        </a:spcAft>
+                        <a:buClrTx/>
+                        <a:buSzTx/>
+                        <a:buFontTx/>
+                        <a:buNone/>
+                        <a:tabLst/>
+                        <a:defRPr/>
+                      </a:pPr>
+                      <a:r>
+                        <a:rPr lang="en-US" altLang="ko-KR" sz="1100" b="1" kern="1200" dirty="0" smtClean="0">
+                          <a:solidFill>
+                            <a:schemeClr val="tx1"/>
+                          </a:solidFill>
+                          <a:latin typeface="HY그래픽M" pitchFamily="18" charset="-127"/>
+                          <a:ea typeface="HY그래픽M" pitchFamily="18" charset="-127"/>
+                          <a:cs typeface="+mn-cs"/>
+                        </a:rPr>
+                        <a:t>STATE 6</a:t>
+                      </a:r>
+                      <a:endParaRPr lang="ko-KR" altLang="en-US" sz="1100" b="1" kern="1200" dirty="0" smtClean="0">
+                        <a:solidFill>
+                          <a:schemeClr val="tx1"/>
+                        </a:solidFill>
+                        <a:latin typeface="HY그래픽M" pitchFamily="18" charset="-127"/>
+                        <a:ea typeface="HY그래픽M" pitchFamily="18" charset="-127"/>
+                        <a:cs typeface="+mn-cs"/>
+                      </a:endParaRPr>
+                    </a:p>
+                  </a:txBody>
+                  <a:tcPr/>
+                </a:tc>
+                <a:tc>
+                  <a:txBody>
+                    <a:bodyPr/>
+                    <a:lstStyle/>
+                    <a:p>
+                      <a:pPr algn="ctr" latinLnBrk="1"/>
+                      <a:r>
+                        <a:rPr lang="ko-KR" altLang="en-US" sz="1100" b="1" kern="1200" dirty="0" smtClean="0">
+                          <a:solidFill>
+                            <a:schemeClr val="tx1"/>
+                          </a:solidFill>
+                          <a:latin typeface="HY그래픽M" pitchFamily="18" charset="-127"/>
+                          <a:ea typeface="HY그래픽M" pitchFamily="18" charset="-127"/>
+                          <a:cs typeface="+mn-cs"/>
+                        </a:rPr>
+                        <a:t>반려 </a:t>
+                      </a:r>
+                      <a:endParaRPr lang="ko-KR" altLang="en-US" sz="1100" b="1" kern="1200" dirty="0">
+                        <a:solidFill>
+                          <a:schemeClr val="tx1"/>
+                        </a:solidFill>
+                        <a:latin typeface="HY그래픽M" pitchFamily="18" charset="-127"/>
+                        <a:ea typeface="HY그래픽M" pitchFamily="18" charset="-127"/>
+                        <a:cs typeface="+mn-cs"/>
+                      </a:endParaRPr>
+                    </a:p>
+                  </a:txBody>
+                  <a:tcPr/>
+                </a:tc>
+                <a:tc>
+                  <a:txBody>
+                    <a:bodyPr/>
+                    <a:lstStyle/>
+                    <a:p>
+                      <a:pPr algn="ctr" latinLnBrk="1"/>
+                      <a:endParaRPr lang="ko-KR" altLang="en-US" sz="1100" b="1" kern="1200" dirty="0">
+                        <a:solidFill>
+                          <a:schemeClr val="tx1"/>
+                        </a:solidFill>
+                        <a:latin typeface="HY그래픽M" pitchFamily="18" charset="-127"/>
+                        <a:ea typeface="HY그래픽M" pitchFamily="18" charset="-127"/>
+                        <a:cs typeface="+mn-cs"/>
+                      </a:endParaRPr>
+                    </a:p>
+                  </a:txBody>
+                  <a:tcPr/>
+                </a:tc>
+                <a:tc>
+                  <a:txBody>
+                    <a:bodyPr/>
+                    <a:lstStyle/>
+                    <a:p>
+                      <a:pPr marL="0" marR="0" indent="0" algn="l" defTabSz="914400" rtl="0" eaLnBrk="1" fontAlgn="auto" latinLnBrk="1" hangingPunct="1">
+                        <a:lnSpc>
+                          <a:spcPct val="100000"/>
+                        </a:lnSpc>
+                        <a:spcBef>
+                          <a:spcPts val="0"/>
+                        </a:spcBef>
+                        <a:spcAft>
+                          <a:spcPts val="0"/>
+                        </a:spcAft>
+                        <a:buClrTx/>
+                        <a:buSzTx/>
+                        <a:buFontTx/>
+                        <a:buNone/>
+                        <a:tabLst/>
+                        <a:defRPr/>
+                      </a:pPr>
+                      <a:r>
+                        <a:rPr lang="ko-KR" altLang="en-US" sz="1100" b="1" kern="1200" dirty="0" smtClean="0">
+                          <a:solidFill>
+                            <a:schemeClr val="tx1"/>
+                          </a:solidFill>
+                          <a:latin typeface="HY그래픽M" pitchFamily="18" charset="-127"/>
+                          <a:ea typeface="HY그래픽M" pitchFamily="18" charset="-127"/>
+                          <a:cs typeface="+mn-cs"/>
+                        </a:rPr>
+                        <a:t>요청된 작업이 반려된 상태</a:t>
+                      </a:r>
+                      <a:r>
+                        <a:rPr lang="en-US" altLang="ko-KR" sz="1100" b="1" kern="1200" dirty="0" smtClean="0">
+                          <a:solidFill>
+                            <a:schemeClr val="tx1"/>
+                          </a:solidFill>
+                          <a:latin typeface="HY그래픽M" pitchFamily="18" charset="-127"/>
+                          <a:ea typeface="HY그래픽M" pitchFamily="18" charset="-127"/>
+                          <a:cs typeface="+mn-cs"/>
+                        </a:rPr>
+                        <a:t>.</a:t>
+                      </a:r>
+                      <a:endParaRPr lang="ko-KR" altLang="en-US" sz="1100" b="1" kern="1200" dirty="0">
+                        <a:solidFill>
+                          <a:schemeClr val="tx1"/>
+                        </a:solidFill>
+                        <a:latin typeface="HY그래픽M" pitchFamily="18" charset="-127"/>
+                        <a:ea typeface="HY그래픽M" pitchFamily="18" charset="-127"/>
+                        <a:cs typeface="+mn-cs"/>
+                      </a:endParaRPr>
+                    </a:p>
+                  </a:txBody>
+                  <a:tcPr/>
+                </a:tc>
+                <a:tc>
+                  <a:txBody>
+                    <a:bodyPr/>
+                    <a:lstStyle/>
+                    <a:p>
+                      <a:pPr algn="ctr" latinLnBrk="1"/>
+                      <a:r>
+                        <a:rPr lang="ko-KR" altLang="en-US" sz="1100" b="1" kern="1200" dirty="0" smtClean="0">
+                          <a:solidFill>
+                            <a:schemeClr val="tx1"/>
+                          </a:solidFill>
+                          <a:latin typeface="HY그래픽M" pitchFamily="18" charset="-127"/>
+                          <a:ea typeface="HY그래픽M" pitchFamily="18" charset="-127"/>
+                          <a:cs typeface="+mn-cs"/>
+                        </a:rPr>
+                        <a:t>완료</a:t>
+                      </a:r>
+                      <a:endParaRPr lang="ko-KR" altLang="en-US" sz="1100" b="1" kern="1200" dirty="0">
+                        <a:solidFill>
+                          <a:schemeClr val="tx1"/>
+                        </a:solidFill>
+                        <a:latin typeface="HY그래픽M" pitchFamily="18" charset="-127"/>
+                        <a:ea typeface="HY그래픽M" pitchFamily="18" charset="-127"/>
+                        <a:cs typeface="+mn-cs"/>
+                      </a:endParaRPr>
+                    </a:p>
+                  </a:txBody>
+                  <a:tcPr/>
+                </a:tc>
+              </a:tr>
+            </a:tbl>
+          </a:graphicData>
+        </a:graphic>
+      </p:graphicFrame>
+      <p:sp>
+        <p:nvSpPr>
+          <p:cNvPr id="9" name="타원 8"/>
+          <p:cNvSpPr/>
+          <p:nvPr/>
+        </p:nvSpPr>
+        <p:spPr>
+          <a:xfrm>
+            <a:off x="1032514" y="2675986"/>
+            <a:ext cx="900000" cy="792000"/>
+          </a:xfrm>
+          <a:prstGeom prst="ellipse">
+            <a:avLst/>
+          </a:prstGeom>
+          <a:solidFill>
+            <a:srgbClr val="77CD47">
+              <a:alpha val="35000"/>
+            </a:srgbClr>
+          </a:solidFill>
+          <a:ln>
+            <a:noFill/>
+          </a:ln>
+        </p:spPr>
+        <p:style>
+          <a:lnRef idx="2">
+            <a:schemeClr val="accent3">
+              <a:shade val="50000"/>
+            </a:schemeClr>
+          </a:lnRef>
+          <a:fillRef idx="1">
+            <a:schemeClr val="accent3"/>
+          </a:fillRef>
+          <a:effectRef idx="0">
+            <a:schemeClr val="accent3"/>
+          </a:effectRef>
+          <a:fontRef idx="minor">
+            <a:schemeClr val="lt1"/>
+          </a:fontRef>
+        </p:style>
+        <p:txBody>
+          <a:bodyPr rtlCol="0" anchor="ctr"/>
+          <a:lstStyle/>
+          <a:p>
+            <a:pPr algn="ctr"/>
+            <a:endParaRPr lang="ko-KR" altLang="en-US"/>
+          </a:p>
+        </p:txBody>
+      </p:sp>
+      <p:sp>
+        <p:nvSpPr>
+          <p:cNvPr id="10" name="타원 9"/>
+          <p:cNvSpPr/>
+          <p:nvPr/>
+        </p:nvSpPr>
+        <p:spPr>
+          <a:xfrm>
+            <a:off x="3111258" y="2653979"/>
+            <a:ext cx="900000" cy="792000"/>
+          </a:xfrm>
+          <a:prstGeom prst="ellipse">
+            <a:avLst/>
+          </a:prstGeom>
+          <a:solidFill>
+            <a:srgbClr val="9D9ECD">
+              <a:alpha val="35000"/>
+            </a:srgbClr>
+          </a:solidFill>
+          <a:ln>
+            <a:noFill/>
+          </a:ln>
+        </p:spPr>
+        <p:style>
+          <a:lnRef idx="2">
+            <a:schemeClr val="accent4">
+              <a:shade val="50000"/>
+            </a:schemeClr>
+          </a:lnRef>
+          <a:fillRef idx="1">
+            <a:schemeClr val="accent4"/>
+          </a:fillRef>
+          <a:effectRef idx="0">
+            <a:schemeClr val="accent4"/>
+          </a:effectRef>
+          <a:fontRef idx="minor">
+            <a:schemeClr val="lt1"/>
+          </a:fontRef>
+        </p:style>
+        <p:txBody>
+          <a:bodyPr rtlCol="0" anchor="ctr"/>
+          <a:lstStyle/>
+          <a:p>
+            <a:pPr algn="ctr"/>
+            <a:endParaRPr lang="ko-KR" altLang="en-US"/>
+          </a:p>
+        </p:txBody>
+      </p:sp>
+      <p:sp>
+        <p:nvSpPr>
+          <p:cNvPr id="11" name="타원 10"/>
+          <p:cNvSpPr/>
+          <p:nvPr/>
+        </p:nvSpPr>
+        <p:spPr>
+          <a:xfrm>
+            <a:off x="2143894" y="1484784"/>
+            <a:ext cx="900000" cy="792000"/>
+          </a:xfrm>
+          <a:prstGeom prst="ellipse">
+            <a:avLst/>
+          </a:prstGeom>
+          <a:solidFill>
+            <a:srgbClr val="77CD47">
+              <a:alpha val="35000"/>
+            </a:srgbClr>
+          </a:solidFill>
+          <a:ln>
+            <a:noFill/>
+          </a:ln>
+        </p:spPr>
+        <p:style>
+          <a:lnRef idx="2">
+            <a:schemeClr val="accent3">
+              <a:shade val="50000"/>
+            </a:schemeClr>
+          </a:lnRef>
+          <a:fillRef idx="1">
+            <a:schemeClr val="accent3"/>
+          </a:fillRef>
+          <a:effectRef idx="0">
+            <a:schemeClr val="accent3"/>
+          </a:effectRef>
+          <a:fontRef idx="minor">
+            <a:schemeClr val="lt1"/>
+          </a:fontRef>
+        </p:style>
+        <p:txBody>
+          <a:bodyPr rtlCol="0" anchor="ctr"/>
+          <a:lstStyle/>
+          <a:p>
+            <a:pPr algn="ctr"/>
+            <a:endParaRPr lang="ko-KR" altLang="en-US"/>
+          </a:p>
+        </p:txBody>
+      </p:sp>
+      <p:sp>
+        <p:nvSpPr>
+          <p:cNvPr id="12" name="타원 11"/>
+          <p:cNvSpPr/>
+          <p:nvPr/>
+        </p:nvSpPr>
+        <p:spPr>
+          <a:xfrm>
+            <a:off x="5432817" y="2675986"/>
+            <a:ext cx="900000" cy="792000"/>
+          </a:xfrm>
+          <a:prstGeom prst="ellipse">
+            <a:avLst/>
+          </a:prstGeom>
+          <a:solidFill>
+            <a:srgbClr val="9D9ECD">
+              <a:alpha val="35000"/>
+            </a:srgbClr>
+          </a:solidFill>
+          <a:ln>
+            <a:noFill/>
+          </a:ln>
+        </p:spPr>
+        <p:style>
+          <a:lnRef idx="2">
+            <a:schemeClr val="accent4">
+              <a:shade val="50000"/>
+            </a:schemeClr>
+          </a:lnRef>
+          <a:fillRef idx="1">
+            <a:schemeClr val="accent4"/>
+          </a:fillRef>
+          <a:effectRef idx="0">
+            <a:schemeClr val="accent4"/>
+          </a:effectRef>
+          <a:fontRef idx="minor">
+            <a:schemeClr val="lt1"/>
+          </a:fontRef>
+        </p:style>
+        <p:txBody>
+          <a:bodyPr rtlCol="0" anchor="ctr"/>
+          <a:lstStyle/>
+          <a:p>
+            <a:pPr algn="ctr"/>
+            <a:endParaRPr lang="ko-KR" altLang="en-US"/>
+          </a:p>
+        </p:txBody>
+      </p:sp>
+      <p:sp>
+        <p:nvSpPr>
+          <p:cNvPr id="13" name="타원 12"/>
+          <p:cNvSpPr/>
+          <p:nvPr/>
+        </p:nvSpPr>
+        <p:spPr>
+          <a:xfrm>
+            <a:off x="7256462" y="3997692"/>
+            <a:ext cx="288032" cy="186025"/>
+          </a:xfrm>
+          <a:prstGeom prst="ellipse">
+            <a:avLst/>
+          </a:prstGeom>
+          <a:solidFill>
+            <a:srgbClr val="9D9ECD">
+              <a:alpha val="35000"/>
+            </a:srgbClr>
+          </a:solidFill>
+          <a:ln>
+            <a:noFill/>
+          </a:ln>
+        </p:spPr>
+        <p:style>
+          <a:lnRef idx="2">
+            <a:schemeClr val="accent4">
+              <a:shade val="50000"/>
+            </a:schemeClr>
+          </a:lnRef>
+          <a:fillRef idx="1">
+            <a:schemeClr val="accent4"/>
+          </a:fillRef>
+          <a:effectRef idx="0">
+            <a:schemeClr val="accent4"/>
+          </a:effectRef>
+          <a:fontRef idx="minor">
+            <a:schemeClr val="lt1"/>
+          </a:fontRef>
+        </p:style>
+        <p:txBody>
+          <a:bodyPr rtlCol="0" anchor="ctr"/>
+          <a:lstStyle/>
+          <a:p>
+            <a:pPr algn="ctr"/>
+            <a:endParaRPr lang="ko-KR" altLang="en-US"/>
+          </a:p>
+        </p:txBody>
+      </p:sp>
+      <p:sp>
+        <p:nvSpPr>
+          <p:cNvPr id="14" name="타원 13"/>
+          <p:cNvSpPr/>
+          <p:nvPr/>
+        </p:nvSpPr>
+        <p:spPr>
+          <a:xfrm>
+            <a:off x="7256462" y="3762519"/>
+            <a:ext cx="288032" cy="186025"/>
+          </a:xfrm>
+          <a:prstGeom prst="ellipse">
+            <a:avLst/>
+          </a:prstGeom>
+          <a:solidFill>
+            <a:srgbClr val="77CD47">
+              <a:alpha val="35000"/>
+            </a:srgbClr>
+          </a:solidFill>
+          <a:ln>
+            <a:noFill/>
+          </a:ln>
+        </p:spPr>
+        <p:style>
+          <a:lnRef idx="2">
+            <a:schemeClr val="accent3">
+              <a:shade val="50000"/>
+            </a:schemeClr>
+          </a:lnRef>
+          <a:fillRef idx="1">
+            <a:schemeClr val="accent3"/>
+          </a:fillRef>
+          <a:effectRef idx="0">
+            <a:schemeClr val="accent3"/>
+          </a:effectRef>
+          <a:fontRef idx="minor">
+            <a:schemeClr val="lt1"/>
+          </a:fontRef>
+        </p:style>
+        <p:txBody>
+          <a:bodyPr rtlCol="0" anchor="ctr"/>
+          <a:lstStyle/>
+          <a:p>
+            <a:pPr algn="ctr"/>
+            <a:endParaRPr lang="ko-KR" altLang="en-US"/>
+          </a:p>
+        </p:txBody>
+      </p:sp>
+      <p:sp>
+        <p:nvSpPr>
+          <p:cNvPr id="8" name="직사각형 7"/>
+          <p:cNvSpPr/>
+          <p:nvPr/>
+        </p:nvSpPr>
+        <p:spPr>
+          <a:xfrm>
+            <a:off x="7488107" y="3717032"/>
+            <a:ext cx="1484702" cy="276999"/>
+          </a:xfrm>
+          <a:prstGeom prst="rect">
+            <a:avLst/>
+          </a:prstGeom>
+        </p:spPr>
+        <p:txBody>
+          <a:bodyPr wrap="none">
+            <a:spAutoFit/>
+          </a:bodyPr>
+          <a:lstStyle/>
+          <a:p>
+            <a:r>
+              <a:rPr lang="en-US" altLang="ko-KR" sz="1200" b="1" dirty="0">
+                <a:latin typeface="HY그래픽M" pitchFamily="18" charset="-127"/>
+                <a:ea typeface="HY그래픽M" pitchFamily="18" charset="-127"/>
+              </a:rPr>
+              <a:t>: </a:t>
+            </a:r>
+            <a:r>
+              <a:rPr lang="ko-KR" altLang="en-US" sz="1200" b="1" dirty="0">
+                <a:latin typeface="HY그래픽M" pitchFamily="18" charset="-127"/>
+                <a:ea typeface="HY그래픽M" pitchFamily="18" charset="-127"/>
+              </a:rPr>
+              <a:t>개발담당자 </a:t>
+            </a:r>
+            <a:r>
+              <a:rPr lang="en-US" altLang="ko-KR" sz="1200" b="1" dirty="0" smtClean="0">
+                <a:latin typeface="HY그래픽M" pitchFamily="18" charset="-127"/>
+                <a:ea typeface="HY그래픽M" pitchFamily="18" charset="-127"/>
+              </a:rPr>
+              <a:t>ROLE</a:t>
+            </a:r>
+            <a:endParaRPr lang="ko-KR" altLang="en-US" sz="1200" b="1" dirty="0">
+              <a:latin typeface="HY그래픽M" pitchFamily="18" charset="-127"/>
+              <a:ea typeface="HY그래픽M" pitchFamily="18" charset="-127"/>
+            </a:endParaRPr>
+          </a:p>
+        </p:txBody>
+      </p:sp>
+      <p:sp>
+        <p:nvSpPr>
+          <p:cNvPr id="16" name="직사각형 15"/>
+          <p:cNvSpPr/>
+          <p:nvPr/>
+        </p:nvSpPr>
+        <p:spPr>
+          <a:xfrm>
+            <a:off x="7488107" y="3952205"/>
+            <a:ext cx="1484702" cy="276999"/>
+          </a:xfrm>
+          <a:prstGeom prst="rect">
+            <a:avLst/>
+          </a:prstGeom>
+        </p:spPr>
+        <p:txBody>
+          <a:bodyPr wrap="none">
+            <a:spAutoFit/>
+          </a:bodyPr>
+          <a:lstStyle/>
+          <a:p>
+            <a:r>
+              <a:rPr lang="en-US" altLang="ko-KR" sz="1200" b="1" dirty="0" smtClean="0">
+                <a:latin typeface="HY그래픽M" pitchFamily="18" charset="-127"/>
+                <a:ea typeface="HY그래픽M" pitchFamily="18" charset="-127"/>
+              </a:rPr>
+              <a:t>: </a:t>
+            </a:r>
+            <a:r>
+              <a:rPr lang="ko-KR" altLang="en-US" sz="1200" b="1" dirty="0">
+                <a:latin typeface="HY그래픽M" pitchFamily="18" charset="-127"/>
+                <a:ea typeface="HY그래픽M" pitchFamily="18" charset="-127"/>
+              </a:rPr>
+              <a:t>출고담당자 </a:t>
+            </a:r>
+            <a:r>
+              <a:rPr lang="en-US" altLang="ko-KR" sz="1200" b="1" dirty="0">
+                <a:latin typeface="HY그래픽M" pitchFamily="18" charset="-127"/>
+                <a:ea typeface="HY그래픽M" pitchFamily="18" charset="-127"/>
+              </a:rPr>
+              <a:t>ROLE</a:t>
+            </a:r>
+            <a:endParaRPr lang="ko-KR" altLang="en-US" sz="1200" b="1" dirty="0">
+              <a:latin typeface="HY그래픽M" pitchFamily="18" charset="-127"/>
+              <a:ea typeface="HY그래픽M" pitchFamily="18" charset="-127"/>
+            </a:endParaRPr>
           </a:p>
         </p:txBody>
       </p:sp>

</xml_diff>